<commit_message>
add productFlavor,dependencies,BuildConfig config usage
</commit_message>
<xml_diff>
--- a/Gradle.pptx
+++ b/Gradle.pptx
@@ -20,7 +20,8 @@
     <p:sldId id="271" r:id="rId14"/>
     <p:sldId id="268" r:id="rId15"/>
     <p:sldId id="269" r:id="rId16"/>
-    <p:sldId id="265" r:id="rId17"/>
+    <p:sldId id="272" r:id="rId17"/>
+    <p:sldId id="265" r:id="rId18"/>
   </p:sldIdLst>
   <p:sldSz cx="9144000" cy="6858000" type="screen4x3"/>
   <p:notesSz cx="6858000" cy="9144000"/>
@@ -298,7 +299,7 @@
           <a:p>
             <a:fld id="{48A87A34-81AB-432B-8DAE-1953F412C126}" type="datetimeFigureOut">
               <a:rPr lang="en-US" smtClean="0"/>
-              <a:t>10/10/2016</a:t>
+              <a:t>10/11/2016</a:t>
             </a:fld>
             <a:endParaRPr lang="en-US" dirty="0"/>
           </a:p>
@@ -610,7 +611,7 @@
           <a:p>
             <a:fld id="{48A87A34-81AB-432B-8DAE-1953F412C126}" type="datetimeFigureOut">
               <a:rPr lang="en-US" smtClean="0"/>
-              <a:t>10/10/2016</a:t>
+              <a:t>10/11/2016</a:t>
             </a:fld>
             <a:endParaRPr lang="en-US" dirty="0"/>
           </a:p>
@@ -832,7 +833,7 @@
           <a:p>
             <a:fld id="{48A87A34-81AB-432B-8DAE-1953F412C126}" type="datetimeFigureOut">
               <a:rPr lang="en-US" smtClean="0"/>
-              <a:t>10/10/2016</a:t>
+              <a:t>10/11/2016</a:t>
             </a:fld>
             <a:endParaRPr lang="en-US" dirty="0"/>
           </a:p>
@@ -1123,7 +1124,7 @@
           <a:p>
             <a:fld id="{48A87A34-81AB-432B-8DAE-1953F412C126}" type="datetimeFigureOut">
               <a:rPr lang="en-US" smtClean="0"/>
-              <a:t>10/10/2016</a:t>
+              <a:t>10/11/2016</a:t>
             </a:fld>
             <a:endParaRPr lang="en-US" dirty="0"/>
           </a:p>
@@ -1577,7 +1578,7 @@
           <a:p>
             <a:fld id="{48A87A34-81AB-432B-8DAE-1953F412C126}" type="datetimeFigureOut">
               <a:rPr lang="en-US" smtClean="0"/>
-              <a:t>10/10/2016</a:t>
+              <a:t>10/11/2016</a:t>
             </a:fld>
             <a:endParaRPr lang="en-US" dirty="0"/>
           </a:p>
@@ -2153,7 +2154,7 @@
           <a:p>
             <a:fld id="{48A87A34-81AB-432B-8DAE-1953F412C126}" type="datetimeFigureOut">
               <a:rPr lang="en-US" smtClean="0"/>
-              <a:t>10/10/2016</a:t>
+              <a:t>10/11/2016</a:t>
             </a:fld>
             <a:endParaRPr lang="en-US" dirty="0"/>
           </a:p>
@@ -3005,7 +3006,7 @@
           <a:p>
             <a:fld id="{48A87A34-81AB-432B-8DAE-1953F412C126}" type="datetimeFigureOut">
               <a:rPr lang="en-US" smtClean="0"/>
-              <a:t>10/10/2016</a:t>
+              <a:t>10/11/2016</a:t>
             </a:fld>
             <a:endParaRPr lang="en-US" dirty="0"/>
           </a:p>
@@ -3210,7 +3211,7 @@
           <a:p>
             <a:fld id="{48A87A34-81AB-432B-8DAE-1953F412C126}" type="datetimeFigureOut">
               <a:rPr lang="en-US" smtClean="0"/>
-              <a:t>10/10/2016</a:t>
+              <a:t>10/11/2016</a:t>
             </a:fld>
             <a:endParaRPr lang="en-US" dirty="0"/>
           </a:p>
@@ -3424,7 +3425,7 @@
           <a:p>
             <a:fld id="{48A87A34-81AB-432B-8DAE-1953F412C126}" type="datetimeFigureOut">
               <a:rPr lang="en-US" smtClean="0"/>
-              <a:t>10/10/2016</a:t>
+              <a:t>10/11/2016</a:t>
             </a:fld>
             <a:endParaRPr lang="en-US" dirty="0"/>
           </a:p>
@@ -3634,7 +3635,7 @@
           <a:p>
             <a:fld id="{48A87A34-81AB-432B-8DAE-1953F412C126}" type="datetimeFigureOut">
               <a:rPr lang="en-US" smtClean="0"/>
-              <a:t>10/10/2016</a:t>
+              <a:t>10/11/2016</a:t>
             </a:fld>
             <a:endParaRPr lang="en-US" dirty="0"/>
           </a:p>
@@ -3914,7 +3915,7 @@
           <a:p>
             <a:fld id="{48A87A34-81AB-432B-8DAE-1953F412C126}" type="datetimeFigureOut">
               <a:rPr lang="en-US" smtClean="0"/>
-              <a:t>10/10/2016</a:t>
+              <a:t>10/11/2016</a:t>
             </a:fld>
             <a:endParaRPr lang="en-US" dirty="0"/>
           </a:p>
@@ -4181,7 +4182,7 @@
           <a:p>
             <a:fld id="{48A87A34-81AB-432B-8DAE-1953F412C126}" type="datetimeFigureOut">
               <a:rPr lang="en-US" smtClean="0"/>
-              <a:t>10/10/2016</a:t>
+              <a:t>10/11/2016</a:t>
             </a:fld>
             <a:endParaRPr lang="en-US" dirty="0"/>
           </a:p>
@@ -4596,7 +4597,7 @@
           <a:p>
             <a:fld id="{48A87A34-81AB-432B-8DAE-1953F412C126}" type="datetimeFigureOut">
               <a:rPr lang="en-US" smtClean="0"/>
-              <a:t>10/10/2016</a:t>
+              <a:t>10/11/2016</a:t>
             </a:fld>
             <a:endParaRPr lang="en-US" dirty="0"/>
           </a:p>
@@ -4744,7 +4745,7 @@
           <a:p>
             <a:fld id="{48A87A34-81AB-432B-8DAE-1953F412C126}" type="datetimeFigureOut">
               <a:rPr lang="en-US" smtClean="0"/>
-              <a:t>10/10/2016</a:t>
+              <a:t>10/11/2016</a:t>
             </a:fld>
             <a:endParaRPr lang="en-US" dirty="0"/>
           </a:p>
@@ -4869,7 +4870,7 @@
           <a:p>
             <a:fld id="{48A87A34-81AB-432B-8DAE-1953F412C126}" type="datetimeFigureOut">
               <a:rPr lang="en-US" smtClean="0"/>
-              <a:t>10/10/2016</a:t>
+              <a:t>10/11/2016</a:t>
             </a:fld>
             <a:endParaRPr lang="en-US" dirty="0"/>
           </a:p>
@@ -5148,7 +5149,7 @@
           <a:p>
             <a:fld id="{48A87A34-81AB-432B-8DAE-1953F412C126}" type="datetimeFigureOut">
               <a:rPr lang="en-US" smtClean="0"/>
-              <a:t>10/10/2016</a:t>
+              <a:t>10/11/2016</a:t>
             </a:fld>
             <a:endParaRPr lang="en-US" dirty="0"/>
           </a:p>
@@ -5460,7 +5461,7 @@
           <a:p>
             <a:fld id="{48A87A34-81AB-432B-8DAE-1953F412C126}" type="datetimeFigureOut">
               <a:rPr lang="en-US" smtClean="0"/>
-              <a:t>10/10/2016</a:t>
+              <a:t>10/11/2016</a:t>
             </a:fld>
             <a:endParaRPr lang="en-US" dirty="0"/>
           </a:p>
@@ -5714,7 +5715,7 @@
             <a:fld id="{48A87A34-81AB-432B-8DAE-1953F412C126}" type="datetimeFigureOut">
               <a:rPr lang="en-US" smtClean="0"/>
               <a:pPr/>
-              <a:t>10/10/2016</a:t>
+              <a:t>10/11/2016</a:t>
             </a:fld>
             <a:endParaRPr lang="en-US" dirty="0"/>
           </a:p>
@@ -6409,7 +6410,7 @@
           <a:p>
             <a:r>
               <a:rPr lang="en-US" altLang="zh-CN" cap="none" dirty="0" err="1" smtClean="0"/>
-              <a:t>Buildconfig</a:t>
+              <a:t>BuildConfig</a:t>
             </a:r>
             <a:endParaRPr lang="en-US" altLang="zh-CN" cap="none" dirty="0" smtClean="0"/>
           </a:p>
@@ -6817,7 +6818,715 @@
           <a:bodyPr/>
           <a:lstStyle/>
           <a:p>
+            <a:r>
+              <a:rPr lang="en-US" altLang="zh-CN" cap="none" dirty="0" smtClean="0"/>
+              <a:t>1.Libs directory</a:t>
+            </a:r>
+            <a:r>
+              <a:rPr lang="zh-CN" altLang="en-US" cap="none" dirty="0" smtClean="0"/>
+              <a:t>：</a:t>
+            </a:r>
+            <a:endParaRPr lang="en-US" altLang="zh-CN" cap="none" dirty="0" smtClean="0"/>
+          </a:p>
+          <a:p>
+            <a:endParaRPr lang="en-US" altLang="zh-CN" cap="none" dirty="0" smtClean="0"/>
+          </a:p>
+          <a:p>
+            <a:endParaRPr lang="en-US" altLang="zh-CN" cap="none" dirty="0" smtClean="0"/>
+          </a:p>
+          <a:p>
+            <a:r>
+              <a:rPr lang="en-US" altLang="zh-CN" cap="none" dirty="0" smtClean="0"/>
+              <a:t>2.</a:t>
+            </a:r>
+            <a:r>
+              <a:rPr lang="en-US" altLang="zh-CN" cap="none" dirty="0" smtClean="0"/>
+              <a:t> Repositories</a:t>
+            </a:r>
+            <a:r>
+              <a:rPr lang="zh-CN" altLang="en-US" cap="none" dirty="0" smtClean="0"/>
+              <a:t>：</a:t>
+            </a:r>
+            <a:endParaRPr lang="en-US" altLang="zh-CN" cap="none" dirty="0" smtClean="0"/>
+          </a:p>
+          <a:p>
+            <a:endParaRPr lang="en-US" altLang="zh-CN" cap="none" dirty="0" smtClean="0"/>
+          </a:p>
+          <a:p>
+            <a:endParaRPr lang="en-US" altLang="zh-CN" cap="none" dirty="0" smtClean="0"/>
+          </a:p>
+          <a:p>
+            <a:r>
+              <a:rPr lang="en-US" altLang="zh-CN" cap="none" dirty="0" smtClean="0"/>
+              <a:t>3.Library projects</a:t>
+            </a:r>
+            <a:r>
+              <a:rPr lang="zh-CN" altLang="en-US" dirty="0" smtClean="0"/>
+              <a:t>：</a:t>
+            </a:r>
             <a:endParaRPr lang="zh-CN" altLang="en-US" dirty="0"/>
+          </a:p>
+        </p:txBody>
+      </p:sp>
+      <p:sp>
+        <p:nvSpPr>
+          <p:cNvPr id="4" name="Rectangle 1"/>
+          <p:cNvSpPr>
+            <a:spLocks noChangeArrowheads="1"/>
+          </p:cNvSpPr>
+          <p:nvPr/>
+        </p:nvSpPr>
+        <p:spPr bwMode="auto">
+          <a:xfrm>
+            <a:off x="3190008" y="2006667"/>
+            <a:ext cx="4426528" cy="830997"/>
+          </a:xfrm>
+          <a:prstGeom prst="rect">
+            <a:avLst/>
+          </a:prstGeom>
+          <a:noFill/>
+          <a:ln>
+            <a:noFill/>
+          </a:ln>
+          <a:effectLst/>
+          <a:extLst>
+            <a:ext uri="{909E8E84-426E-40DD-AFC4-6F175D3DCCD1}">
+              <a14:hiddenFill xmlns:a14="http://schemas.microsoft.com/office/drawing/2010/main">
+                <a:solidFill>
+                  <a:schemeClr val="accent1"/>
+                </a:solidFill>
+              </a14:hiddenFill>
+            </a:ext>
+            <a:ext uri="{91240B29-F687-4F45-9708-019B960494DF}">
+              <a14:hiddenLine xmlns:a14="http://schemas.microsoft.com/office/drawing/2010/main" w="9525">
+                <a:solidFill>
+                  <a:schemeClr val="tx1"/>
+                </a:solidFill>
+                <a:miter lim="800000"/>
+                <a:headEnd/>
+                <a:tailEnd/>
+              </a14:hiddenLine>
+            </a:ext>
+            <a:ext uri="{AF507438-7753-43E0-B8FC-AC1667EBCBE1}">
+              <a14:hiddenEffects xmlns:a14="http://schemas.microsoft.com/office/drawing/2010/main">
+                <a:effectLst>
+                  <a:outerShdw dist="35921" dir="2700000" algn="ctr" rotWithShape="0">
+                    <a:schemeClr val="bg2"/>
+                  </a:outerShdw>
+                </a:effectLst>
+              </a14:hiddenEffects>
+            </a:ext>
+          </a:extLst>
+        </p:spPr>
+        <p:txBody>
+          <a:bodyPr vert="horz" wrap="square" lIns="91440" tIns="45720" rIns="91440" bIns="45720" numCol="1" anchor="ctr" anchorCtr="0" compatLnSpc="1">
+            <a:prstTxWarp prst="textNoShape">
+              <a:avLst/>
+            </a:prstTxWarp>
+            <a:spAutoFit/>
+          </a:bodyPr>
+          <a:lstStyle/>
+          <a:p>
+            <a:pPr marL="0" marR="0" lvl="0" indent="0" algn="l" defTabSz="914400" rtl="0" eaLnBrk="0" fontAlgn="base" latinLnBrk="0" hangingPunct="0">
+              <a:lnSpc>
+                <a:spcPct val="100000"/>
+              </a:lnSpc>
+              <a:spcBef>
+                <a:spcPct val="0"/>
+              </a:spcBef>
+              <a:spcAft>
+                <a:spcPct val="0"/>
+              </a:spcAft>
+              <a:buClrTx/>
+              <a:buSzTx/>
+              <a:buFontTx/>
+              <a:buNone/>
+              <a:tabLst/>
+            </a:pPr>
+            <a:r>
+              <a:rPr kumimoji="0" lang="zh-CN" altLang="zh-CN" sz="1600" b="0" i="0" u="none" strike="noStrike" cap="none" normalizeH="0" baseline="0" dirty="0" smtClean="0">
+                <a:ln>
+                  <a:noFill/>
+                </a:ln>
+                <a:solidFill>
+                  <a:srgbClr val="006000"/>
+                </a:solidFill>
+                <a:effectLst/>
+                <a:latin typeface="Arial Unicode MS" panose="020B0604020202020204" pitchFamily="34" charset="-122"/>
+              </a:rPr>
+              <a:t>dependencies {</a:t>
+            </a:r>
+            <a:r>
+              <a:rPr kumimoji="0" lang="zh-CN" altLang="zh-CN" sz="1600" b="0" i="0" u="none" strike="noStrike" cap="none" normalizeH="0" baseline="0" dirty="0" smtClean="0">
+                <a:ln>
+                  <a:noFill/>
+                </a:ln>
+                <a:solidFill>
+                  <a:schemeClr val="tx1"/>
+                </a:solidFill>
+                <a:effectLst/>
+              </a:rPr>
+              <a:t/>
+            </a:r>
+            <a:br>
+              <a:rPr kumimoji="0" lang="zh-CN" altLang="zh-CN" sz="1600" b="0" i="0" u="none" strike="noStrike" cap="none" normalizeH="0" baseline="0" dirty="0" smtClean="0">
+                <a:ln>
+                  <a:noFill/>
+                </a:ln>
+                <a:solidFill>
+                  <a:schemeClr val="tx1"/>
+                </a:solidFill>
+                <a:effectLst/>
+              </a:rPr>
+            </a:br>
+            <a:r>
+              <a:rPr kumimoji="0" lang="zh-CN" altLang="zh-CN" sz="1600" b="0" i="0" u="none" strike="noStrike" cap="none" normalizeH="0" baseline="0" dirty="0" smtClean="0">
+                <a:ln>
+                  <a:noFill/>
+                </a:ln>
+                <a:solidFill>
+                  <a:srgbClr val="006000"/>
+                </a:solidFill>
+                <a:effectLst/>
+                <a:latin typeface="Arial Unicode MS" panose="020B0604020202020204" pitchFamily="34" charset="-122"/>
+              </a:rPr>
+              <a:t>    compile fileTree(dir: 'libs', include: ['*.jar'])</a:t>
+            </a:r>
+            <a:r>
+              <a:rPr kumimoji="0" lang="zh-CN" altLang="zh-CN" sz="1600" b="0" i="0" u="none" strike="noStrike" cap="none" normalizeH="0" baseline="0" dirty="0" smtClean="0">
+                <a:ln>
+                  <a:noFill/>
+                </a:ln>
+                <a:solidFill>
+                  <a:schemeClr val="tx1"/>
+                </a:solidFill>
+                <a:effectLst/>
+              </a:rPr>
+              <a:t/>
+            </a:r>
+            <a:br>
+              <a:rPr kumimoji="0" lang="zh-CN" altLang="zh-CN" sz="1600" b="0" i="0" u="none" strike="noStrike" cap="none" normalizeH="0" baseline="0" dirty="0" smtClean="0">
+                <a:ln>
+                  <a:noFill/>
+                </a:ln>
+                <a:solidFill>
+                  <a:schemeClr val="tx1"/>
+                </a:solidFill>
+                <a:effectLst/>
+              </a:rPr>
+            </a:br>
+            <a:r>
+              <a:rPr kumimoji="0" lang="zh-CN" altLang="zh-CN" sz="1600" b="0" i="0" u="none" strike="noStrike" cap="none" normalizeH="0" baseline="0" dirty="0" smtClean="0">
+                <a:ln>
+                  <a:noFill/>
+                </a:ln>
+                <a:solidFill>
+                  <a:srgbClr val="006000"/>
+                </a:solidFill>
+                <a:effectLst/>
+                <a:latin typeface="Arial Unicode MS" panose="020B0604020202020204" pitchFamily="34" charset="-122"/>
+              </a:rPr>
+              <a:t>}</a:t>
+            </a:r>
+            <a:r>
+              <a:rPr kumimoji="0" lang="zh-CN" altLang="zh-CN" sz="1600" b="0" i="0" u="none" strike="noStrike" cap="none" normalizeH="0" baseline="0" dirty="0" smtClean="0">
+                <a:ln>
+                  <a:noFill/>
+                </a:ln>
+                <a:solidFill>
+                  <a:schemeClr val="tx1"/>
+                </a:solidFill>
+                <a:effectLst/>
+              </a:rPr>
+              <a:t> </a:t>
+            </a:r>
+            <a:endParaRPr kumimoji="0" lang="zh-CN" altLang="zh-CN" sz="1600" b="0" i="0" u="none" strike="noStrike" cap="none" normalizeH="0" baseline="0" dirty="0" smtClean="0">
+              <a:ln>
+                <a:noFill/>
+              </a:ln>
+              <a:solidFill>
+                <a:schemeClr val="tx1"/>
+              </a:solidFill>
+              <a:effectLst/>
+              <a:latin typeface="Arial" panose="020B0604020202020204" pitchFamily="34" charset="0"/>
+            </a:endParaRPr>
+          </a:p>
+        </p:txBody>
+      </p:sp>
+      <p:sp>
+        <p:nvSpPr>
+          <p:cNvPr id="5" name="Rectangle 2"/>
+          <p:cNvSpPr>
+            <a:spLocks noChangeArrowheads="1"/>
+          </p:cNvSpPr>
+          <p:nvPr/>
+        </p:nvSpPr>
+        <p:spPr bwMode="auto">
+          <a:xfrm>
+            <a:off x="3190008" y="3318621"/>
+            <a:ext cx="3979718" cy="1077218"/>
+          </a:xfrm>
+          <a:prstGeom prst="rect">
+            <a:avLst/>
+          </a:prstGeom>
+          <a:noFill/>
+          <a:ln>
+            <a:noFill/>
+          </a:ln>
+          <a:effectLst/>
+          <a:extLst>
+            <a:ext uri="{909E8E84-426E-40DD-AFC4-6F175D3DCCD1}">
+              <a14:hiddenFill xmlns:a14="http://schemas.microsoft.com/office/drawing/2010/main">
+                <a:solidFill>
+                  <a:schemeClr val="accent1"/>
+                </a:solidFill>
+              </a14:hiddenFill>
+            </a:ext>
+            <a:ext uri="{91240B29-F687-4F45-9708-019B960494DF}">
+              <a14:hiddenLine xmlns:a14="http://schemas.microsoft.com/office/drawing/2010/main" w="9525">
+                <a:solidFill>
+                  <a:schemeClr val="tx1"/>
+                </a:solidFill>
+                <a:miter lim="800000"/>
+                <a:headEnd/>
+                <a:tailEnd/>
+              </a14:hiddenLine>
+            </a:ext>
+            <a:ext uri="{AF507438-7753-43E0-B8FC-AC1667EBCBE1}">
+              <a14:hiddenEffects xmlns:a14="http://schemas.microsoft.com/office/drawing/2010/main">
+                <a:effectLst>
+                  <a:outerShdw dist="35921" dir="2700000" algn="ctr" rotWithShape="0">
+                    <a:schemeClr val="bg2"/>
+                  </a:outerShdw>
+                </a:effectLst>
+              </a14:hiddenEffects>
+            </a:ext>
+          </a:extLst>
+        </p:spPr>
+        <p:txBody>
+          <a:bodyPr vert="horz" wrap="square" lIns="91440" tIns="45720" rIns="91440" bIns="45720" numCol="1" anchor="ctr" anchorCtr="0" compatLnSpc="1">
+            <a:prstTxWarp prst="textNoShape">
+              <a:avLst/>
+            </a:prstTxWarp>
+            <a:spAutoFit/>
+          </a:bodyPr>
+          <a:lstStyle/>
+          <a:p>
+            <a:pPr marL="0" marR="0" lvl="0" indent="0" algn="l" defTabSz="914400" rtl="0" eaLnBrk="0" fontAlgn="base" latinLnBrk="0" hangingPunct="0">
+              <a:lnSpc>
+                <a:spcPct val="100000"/>
+              </a:lnSpc>
+              <a:spcBef>
+                <a:spcPct val="0"/>
+              </a:spcBef>
+              <a:spcAft>
+                <a:spcPct val="0"/>
+              </a:spcAft>
+              <a:buClrTx/>
+              <a:buSzTx/>
+              <a:buFontTx/>
+              <a:buNone/>
+              <a:tabLst/>
+            </a:pPr>
+            <a:r>
+              <a:rPr kumimoji="0" lang="zh-CN" altLang="zh-CN" sz="1600" b="0" i="0" u="none" strike="noStrike" cap="none" normalizeH="0" baseline="0" dirty="0" smtClean="0">
+                <a:ln>
+                  <a:noFill/>
+                </a:ln>
+                <a:solidFill>
+                  <a:srgbClr val="006000"/>
+                </a:solidFill>
+                <a:effectLst/>
+                <a:latin typeface="Arial Unicode MS" panose="020B0604020202020204" pitchFamily="34" charset="-122"/>
+              </a:rPr>
+              <a:t>repositories {     jcenter()</a:t>
+            </a:r>
+            <a:r>
+              <a:rPr kumimoji="0" lang="en-US" altLang="zh-CN" sz="1600" b="0" i="0" u="none" strike="noStrike" cap="none" normalizeH="0" baseline="0" dirty="0" smtClean="0">
+                <a:ln>
+                  <a:noFill/>
+                </a:ln>
+                <a:solidFill>
+                  <a:srgbClr val="006000"/>
+                </a:solidFill>
+                <a:effectLst/>
+                <a:latin typeface="Arial Unicode MS" panose="020B0604020202020204" pitchFamily="34" charset="-122"/>
+              </a:rPr>
+              <a:t>     </a:t>
+            </a:r>
+            <a:r>
+              <a:rPr kumimoji="0" lang="zh-CN" altLang="zh-CN" sz="1600" b="0" i="0" u="none" strike="noStrike" cap="none" normalizeH="0" baseline="0" dirty="0" smtClean="0">
+                <a:ln>
+                  <a:noFill/>
+                </a:ln>
+                <a:solidFill>
+                  <a:srgbClr val="006000"/>
+                </a:solidFill>
+                <a:effectLst/>
+                <a:latin typeface="Arial Unicode MS" panose="020B0604020202020204" pitchFamily="34" charset="-122"/>
+              </a:rPr>
+              <a:t>}</a:t>
+            </a:r>
+            <a:r>
+              <a:rPr kumimoji="0" lang="zh-CN" altLang="zh-CN" sz="1600" b="0" i="0" u="none" strike="noStrike" cap="none" normalizeH="0" baseline="0" dirty="0" smtClean="0">
+                <a:ln>
+                  <a:noFill/>
+                </a:ln>
+                <a:solidFill>
+                  <a:schemeClr val="tx1"/>
+                </a:solidFill>
+                <a:effectLst/>
+                <a:latin typeface="Arial" panose="020B0604020202020204" pitchFamily="34" charset="0"/>
+              </a:rPr>
+              <a:t/>
+            </a:r>
+            <a:br>
+              <a:rPr kumimoji="0" lang="zh-CN" altLang="zh-CN" sz="1600" b="0" i="0" u="none" strike="noStrike" cap="none" normalizeH="0" baseline="0" dirty="0" smtClean="0">
+                <a:ln>
+                  <a:noFill/>
+                </a:ln>
+                <a:solidFill>
+                  <a:schemeClr val="tx1"/>
+                </a:solidFill>
+                <a:effectLst/>
+                <a:latin typeface="Arial" panose="020B0604020202020204" pitchFamily="34" charset="0"/>
+              </a:rPr>
+            </a:br>
+            <a:r>
+              <a:rPr kumimoji="0" lang="zh-CN" altLang="zh-CN" sz="1600" b="0" i="0" u="none" strike="noStrike" cap="none" normalizeH="0" baseline="0" dirty="0" smtClean="0">
+                <a:ln>
+                  <a:noFill/>
+                </a:ln>
+                <a:solidFill>
+                  <a:srgbClr val="006000"/>
+                </a:solidFill>
+                <a:effectLst/>
+                <a:latin typeface="Arial Unicode MS" panose="020B0604020202020204" pitchFamily="34" charset="-122"/>
+              </a:rPr>
+              <a:t>dependencies {</a:t>
+            </a:r>
+            <a:r>
+              <a:rPr kumimoji="0" lang="zh-CN" altLang="zh-CN" sz="1600" b="0" i="0" u="none" strike="noStrike" cap="none" normalizeH="0" baseline="0" dirty="0" smtClean="0">
+                <a:ln>
+                  <a:noFill/>
+                </a:ln>
+                <a:solidFill>
+                  <a:schemeClr val="tx1"/>
+                </a:solidFill>
+                <a:effectLst/>
+              </a:rPr>
+              <a:t/>
+            </a:r>
+            <a:br>
+              <a:rPr kumimoji="0" lang="zh-CN" altLang="zh-CN" sz="1600" b="0" i="0" u="none" strike="noStrike" cap="none" normalizeH="0" baseline="0" dirty="0" smtClean="0">
+                <a:ln>
+                  <a:noFill/>
+                </a:ln>
+                <a:solidFill>
+                  <a:schemeClr val="tx1"/>
+                </a:solidFill>
+                <a:effectLst/>
+              </a:rPr>
+            </a:br>
+            <a:r>
+              <a:rPr kumimoji="0" lang="zh-CN" altLang="zh-CN" sz="1600" b="0" i="0" u="none" strike="noStrike" cap="none" normalizeH="0" baseline="0" dirty="0" smtClean="0">
+                <a:ln>
+                  <a:noFill/>
+                </a:ln>
+                <a:solidFill>
+                  <a:srgbClr val="006000"/>
+                </a:solidFill>
+                <a:effectLst/>
+                <a:latin typeface="Arial Unicode MS" panose="020B0604020202020204" pitchFamily="34" charset="-122"/>
+              </a:rPr>
+              <a:t>    compile 'com.google.guava:guava:18.0'</a:t>
+            </a:r>
+            <a:r>
+              <a:rPr kumimoji="0" lang="zh-CN" altLang="zh-CN" sz="1600" b="0" i="0" u="none" strike="noStrike" cap="none" normalizeH="0" baseline="0" dirty="0" smtClean="0">
+                <a:ln>
+                  <a:noFill/>
+                </a:ln>
+                <a:solidFill>
+                  <a:schemeClr val="tx1"/>
+                </a:solidFill>
+                <a:effectLst/>
+              </a:rPr>
+              <a:t/>
+            </a:r>
+            <a:br>
+              <a:rPr kumimoji="0" lang="zh-CN" altLang="zh-CN" sz="1600" b="0" i="0" u="none" strike="noStrike" cap="none" normalizeH="0" baseline="0" dirty="0" smtClean="0">
+                <a:ln>
+                  <a:noFill/>
+                </a:ln>
+                <a:solidFill>
+                  <a:schemeClr val="tx1"/>
+                </a:solidFill>
+                <a:effectLst/>
+              </a:rPr>
+            </a:br>
+            <a:r>
+              <a:rPr kumimoji="0" lang="zh-CN" altLang="zh-CN" sz="1600" b="0" i="0" u="none" strike="noStrike" cap="none" normalizeH="0" baseline="0" dirty="0" smtClean="0">
+                <a:ln>
+                  <a:noFill/>
+                </a:ln>
+                <a:solidFill>
+                  <a:srgbClr val="006000"/>
+                </a:solidFill>
+                <a:effectLst/>
+                <a:latin typeface="Arial Unicode MS" panose="020B0604020202020204" pitchFamily="34" charset="-122"/>
+              </a:rPr>
+              <a:t>}</a:t>
+            </a:r>
+            <a:r>
+              <a:rPr kumimoji="0" lang="zh-CN" altLang="zh-CN" sz="1600" b="0" i="0" u="none" strike="noStrike" cap="none" normalizeH="0" baseline="0" dirty="0" smtClean="0">
+                <a:ln>
+                  <a:noFill/>
+                </a:ln>
+                <a:solidFill>
+                  <a:schemeClr val="tx1"/>
+                </a:solidFill>
+                <a:effectLst/>
+              </a:rPr>
+              <a:t> </a:t>
+            </a:r>
+            <a:endParaRPr kumimoji="0" lang="zh-CN" altLang="zh-CN" sz="1600" b="0" i="0" u="none" strike="noStrike" cap="none" normalizeH="0" baseline="0" dirty="0" smtClean="0">
+              <a:ln>
+                <a:noFill/>
+              </a:ln>
+              <a:solidFill>
+                <a:schemeClr val="tx1"/>
+              </a:solidFill>
+              <a:effectLst/>
+              <a:latin typeface="Arial" panose="020B0604020202020204" pitchFamily="34" charset="0"/>
+            </a:endParaRPr>
+          </a:p>
+        </p:txBody>
+      </p:sp>
+      <p:sp>
+        <p:nvSpPr>
+          <p:cNvPr id="6" name="Rectangle 3"/>
+          <p:cNvSpPr>
+            <a:spLocks noChangeArrowheads="1"/>
+          </p:cNvSpPr>
+          <p:nvPr/>
+        </p:nvSpPr>
+        <p:spPr bwMode="auto">
+          <a:xfrm>
+            <a:off x="3190008" y="5242386"/>
+            <a:ext cx="4790209" cy="830997"/>
+          </a:xfrm>
+          <a:prstGeom prst="rect">
+            <a:avLst/>
+          </a:prstGeom>
+          <a:noFill/>
+          <a:ln>
+            <a:noFill/>
+          </a:ln>
+          <a:effectLst/>
+          <a:extLst>
+            <a:ext uri="{909E8E84-426E-40DD-AFC4-6F175D3DCCD1}">
+              <a14:hiddenFill xmlns:a14="http://schemas.microsoft.com/office/drawing/2010/main">
+                <a:solidFill>
+                  <a:schemeClr val="accent1"/>
+                </a:solidFill>
+              </a14:hiddenFill>
+            </a:ext>
+            <a:ext uri="{91240B29-F687-4F45-9708-019B960494DF}">
+              <a14:hiddenLine xmlns:a14="http://schemas.microsoft.com/office/drawing/2010/main" w="9525">
+                <a:solidFill>
+                  <a:schemeClr val="tx1"/>
+                </a:solidFill>
+                <a:miter lim="800000"/>
+                <a:headEnd/>
+                <a:tailEnd/>
+              </a14:hiddenLine>
+            </a:ext>
+            <a:ext uri="{AF507438-7753-43E0-B8FC-AC1667EBCBE1}">
+              <a14:hiddenEffects xmlns:a14="http://schemas.microsoft.com/office/drawing/2010/main">
+                <a:effectLst>
+                  <a:outerShdw dist="35921" dir="2700000" algn="ctr" rotWithShape="0">
+                    <a:schemeClr val="bg2"/>
+                  </a:outerShdw>
+                </a:effectLst>
+              </a14:hiddenEffects>
+            </a:ext>
+          </a:extLst>
+        </p:spPr>
+        <p:txBody>
+          <a:bodyPr vert="horz" wrap="square" lIns="91440" tIns="45720" rIns="91440" bIns="45720" numCol="1" anchor="ctr" anchorCtr="0" compatLnSpc="1">
+            <a:prstTxWarp prst="textNoShape">
+              <a:avLst/>
+            </a:prstTxWarp>
+            <a:spAutoFit/>
+          </a:bodyPr>
+          <a:lstStyle/>
+          <a:p>
+            <a:pPr marL="0" marR="0" lvl="0" indent="0" algn="l" defTabSz="914400" rtl="0" eaLnBrk="0" fontAlgn="base" latinLnBrk="0" hangingPunct="0">
+              <a:lnSpc>
+                <a:spcPct val="100000"/>
+              </a:lnSpc>
+              <a:spcBef>
+                <a:spcPct val="0"/>
+              </a:spcBef>
+              <a:spcAft>
+                <a:spcPct val="0"/>
+              </a:spcAft>
+              <a:buClrTx/>
+              <a:buSzTx/>
+              <a:buFontTx/>
+              <a:buNone/>
+              <a:tabLst/>
+            </a:pPr>
+            <a:r>
+              <a:rPr kumimoji="0" lang="zh-CN" altLang="zh-CN" sz="1600" b="0" i="0" u="none" strike="noStrike" cap="none" normalizeH="0" baseline="0" dirty="0" smtClean="0">
+                <a:ln>
+                  <a:noFill/>
+                </a:ln>
+                <a:solidFill>
+                  <a:srgbClr val="006000"/>
+                </a:solidFill>
+                <a:effectLst/>
+                <a:latin typeface="Arial Unicode MS" panose="020B0604020202020204" pitchFamily="34" charset="-122"/>
+              </a:rPr>
+              <a:t>dependencies {</a:t>
+            </a:r>
+            <a:r>
+              <a:rPr kumimoji="0" lang="zh-CN" altLang="zh-CN" sz="1600" b="0" i="0" u="none" strike="noStrike" cap="none" normalizeH="0" baseline="0" dirty="0" smtClean="0">
+                <a:ln>
+                  <a:noFill/>
+                </a:ln>
+                <a:solidFill>
+                  <a:schemeClr val="tx1"/>
+                </a:solidFill>
+                <a:effectLst/>
+              </a:rPr>
+              <a:t/>
+            </a:r>
+            <a:br>
+              <a:rPr kumimoji="0" lang="zh-CN" altLang="zh-CN" sz="1600" b="0" i="0" u="none" strike="noStrike" cap="none" normalizeH="0" baseline="0" dirty="0" smtClean="0">
+                <a:ln>
+                  <a:noFill/>
+                </a:ln>
+                <a:solidFill>
+                  <a:schemeClr val="tx1"/>
+                </a:solidFill>
+                <a:effectLst/>
+              </a:rPr>
+            </a:br>
+            <a:r>
+              <a:rPr kumimoji="0" lang="zh-CN" altLang="zh-CN" sz="1600" b="0" i="0" u="none" strike="noStrike" cap="none" normalizeH="0" baseline="0" dirty="0" smtClean="0">
+                <a:ln>
+                  <a:noFill/>
+                </a:ln>
+                <a:solidFill>
+                  <a:srgbClr val="006000"/>
+                </a:solidFill>
+                <a:effectLst/>
+                <a:latin typeface="Arial Unicode MS" panose="020B0604020202020204" pitchFamily="34" charset="-122"/>
+              </a:rPr>
+              <a:t>     compile project(':libraries:lib1')</a:t>
+            </a:r>
+            <a:r>
+              <a:rPr kumimoji="0" lang="zh-CN" altLang="zh-CN" sz="1600" b="0" i="0" u="none" strike="noStrike" cap="none" normalizeH="0" baseline="0" dirty="0" smtClean="0">
+                <a:ln>
+                  <a:noFill/>
+                </a:ln>
+                <a:solidFill>
+                  <a:schemeClr val="tx1"/>
+                </a:solidFill>
+                <a:effectLst/>
+              </a:rPr>
+              <a:t/>
+            </a:r>
+            <a:br>
+              <a:rPr kumimoji="0" lang="zh-CN" altLang="zh-CN" sz="1600" b="0" i="0" u="none" strike="noStrike" cap="none" normalizeH="0" baseline="0" dirty="0" smtClean="0">
+                <a:ln>
+                  <a:noFill/>
+                </a:ln>
+                <a:solidFill>
+                  <a:schemeClr val="tx1"/>
+                </a:solidFill>
+                <a:effectLst/>
+              </a:rPr>
+            </a:br>
+            <a:r>
+              <a:rPr kumimoji="0" lang="zh-CN" altLang="zh-CN" sz="1600" b="0" i="0" u="none" strike="noStrike" cap="none" normalizeH="0" baseline="0" dirty="0" smtClean="0">
+                <a:ln>
+                  <a:noFill/>
+                </a:ln>
+                <a:solidFill>
+                  <a:srgbClr val="006000"/>
+                </a:solidFill>
+                <a:effectLst/>
+                <a:latin typeface="Arial Unicode MS" panose="020B0604020202020204" pitchFamily="34" charset="-122"/>
+              </a:rPr>
+              <a:t>}</a:t>
+            </a:r>
+            <a:r>
+              <a:rPr kumimoji="0" lang="zh-CN" altLang="zh-CN" sz="1600" b="0" i="0" u="none" strike="noStrike" cap="none" normalizeH="0" baseline="0" dirty="0" smtClean="0">
+                <a:ln>
+                  <a:noFill/>
+                </a:ln>
+                <a:solidFill>
+                  <a:schemeClr val="tx1"/>
+                </a:solidFill>
+                <a:effectLst/>
+              </a:rPr>
+              <a:t> </a:t>
+            </a:r>
+            <a:endParaRPr kumimoji="0" lang="zh-CN" altLang="zh-CN" sz="1600" b="0" i="0" u="none" strike="noStrike" cap="none" normalizeH="0" baseline="0" dirty="0" smtClean="0">
+              <a:ln>
+                <a:noFill/>
+              </a:ln>
+              <a:solidFill>
+                <a:schemeClr val="tx1"/>
+              </a:solidFill>
+              <a:effectLst/>
+              <a:latin typeface="Arial" panose="020B0604020202020204" pitchFamily="34" charset="0"/>
+            </a:endParaRPr>
+          </a:p>
+        </p:txBody>
+      </p:sp>
+      <p:sp>
+        <p:nvSpPr>
+          <p:cNvPr id="7" name="矩形 6"/>
+          <p:cNvSpPr/>
+          <p:nvPr/>
+        </p:nvSpPr>
+        <p:spPr>
+          <a:xfrm>
+            <a:off x="3190008" y="4925098"/>
+            <a:ext cx="5678633" cy="338554"/>
+          </a:xfrm>
+          <a:prstGeom prst="rect">
+            <a:avLst/>
+          </a:prstGeom>
+        </p:spPr>
+        <p:txBody>
+          <a:bodyPr wrap="square">
+            <a:spAutoFit/>
+          </a:bodyPr>
+          <a:lstStyle/>
+          <a:p>
+            <a:r>
+              <a:rPr lang="en-US" altLang="zh-CN" sz="1600" dirty="0">
+                <a:solidFill>
+                  <a:srgbClr val="006000"/>
+                </a:solidFill>
+                <a:latin typeface="Courier New" panose="02070309020205020404" pitchFamily="49" charset="0"/>
+              </a:rPr>
+              <a:t>include ':app', ':libraries:lib1</a:t>
+            </a:r>
+            <a:r>
+              <a:rPr lang="en-US" altLang="zh-CN" sz="1600" dirty="0" smtClean="0">
+                <a:solidFill>
+                  <a:srgbClr val="006000"/>
+                </a:solidFill>
+                <a:latin typeface="Courier New" panose="02070309020205020404" pitchFamily="49" charset="0"/>
+              </a:rPr>
+              <a:t>'</a:t>
+            </a:r>
+            <a:endParaRPr lang="zh-CN" altLang="en-US" sz="1600" dirty="0"/>
           </a:p>
         </p:txBody>
       </p:sp>
@@ -7573,6 +8282,9 @@
             <a:endParaRPr lang="en-US" altLang="zh-CN" dirty="0" smtClean="0"/>
           </a:p>
           <a:p>
+            <a:endParaRPr lang="en-US" altLang="zh-CN" dirty="0" smtClean="0"/>
+          </a:p>
+          <a:p>
             <a:r>
               <a:rPr lang="en-US" altLang="zh-CN" dirty="0"/>
               <a:t>m</a:t>
@@ -7596,12 +8308,18 @@
           </a:p>
           <a:p>
             <a:r>
-              <a:rPr lang="en-US" altLang="zh-CN" dirty="0"/>
-              <a:t>t</a:t>
-            </a:r>
+              <a:rPr lang="en-US" altLang="zh-CN" dirty="0" err="1"/>
+              <a:t>debug_ant</a:t>
+            </a:r>
+            <a:endParaRPr lang="en-US" altLang="zh-CN" dirty="0"/>
+          </a:p>
+          <a:p>
+            <a:endParaRPr lang="en-US" altLang="zh-CN" dirty="0" smtClean="0"/>
+          </a:p>
+          <a:p>
             <a:r>
               <a:rPr lang="en-US" altLang="zh-CN" dirty="0" smtClean="0"/>
-              <a:t>est</a:t>
+              <a:t>test</a:t>
             </a:r>
           </a:p>
           <a:p>
@@ -7615,23 +8333,6 @@
             <a:r>
               <a:rPr lang="en-US" altLang="zh-CN" dirty="0" err="1" smtClean="0"/>
               <a:t>testRelease</a:t>
-            </a:r>
-            <a:endParaRPr lang="en-US" altLang="zh-CN" dirty="0" smtClean="0"/>
-          </a:p>
-          <a:p>
-            <a:endParaRPr lang="en-US" altLang="zh-CN" dirty="0" smtClean="0"/>
-          </a:p>
-          <a:p>
-            <a:endParaRPr lang="en-US" altLang="zh-CN" dirty="0" smtClean="0"/>
-          </a:p>
-          <a:p>
-            <a:r>
-              <a:rPr lang="en-US" altLang="zh-CN" dirty="0" err="1"/>
-              <a:t>d</a:t>
-            </a:r>
-            <a:r>
-              <a:rPr lang="en-US" altLang="zh-CN" dirty="0" err="1" smtClean="0"/>
-              <a:t>ebug_ant</a:t>
             </a:r>
             <a:endParaRPr lang="en-US" altLang="zh-CN" dirty="0" smtClean="0"/>
           </a:p>
@@ -7689,26 +8390,633 @@
           <a:bodyPr/>
           <a:lstStyle/>
           <a:p>
-            <a:endParaRPr lang="zh-CN" altLang="en-US"/>
-          </a:p>
-        </p:txBody>
-      </p:sp>
-      <p:sp>
-        <p:nvSpPr>
-          <p:cNvPr id="3" name="内容占位符 2"/>
-          <p:cNvSpPr>
-            <a:spLocks noGrp="1"/>
+            <a:r>
+              <a:rPr lang="en-US" altLang="zh-CN" dirty="0" smtClean="0"/>
+              <a:t>4.</a:t>
+            </a:r>
+            <a:r>
+              <a:rPr lang="en-US" altLang="zh-CN" cap="none" dirty="0"/>
+              <a:t> </a:t>
+            </a:r>
+            <a:r>
+              <a:rPr lang="en-US" altLang="zh-CN" cap="none" dirty="0" smtClean="0"/>
+              <a:t>Product Flavor </a:t>
+            </a:r>
+            <a:endParaRPr lang="zh-CN" altLang="en-US" dirty="0"/>
+          </a:p>
+        </p:txBody>
+      </p:sp>
+      <p:sp>
+        <p:nvSpPr>
+          <p:cNvPr id="4" name="Rectangle 1"/>
+          <p:cNvSpPr>
+            <a:spLocks noGrp="1" noChangeArrowheads="1"/>
           </p:cNvSpPr>
           <p:nvPr>
             <p:ph sz="quarter" idx="13"/>
           </p:nvPr>
         </p:nvSpPr>
-        <p:spPr/>
-        <p:txBody>
-          <a:bodyPr/>
+        <p:spPr bwMode="auto">
+          <a:xfrm>
+            <a:off x="789240" y="1931457"/>
+            <a:ext cx="2130606" cy="2554545"/>
+          </a:xfrm>
+          <a:prstGeom prst="rect">
+            <a:avLst/>
+          </a:prstGeom>
+          <a:noFill/>
+          <a:ln>
+            <a:noFill/>
+          </a:ln>
+          <a:effectLst/>
+          <a:extLst>
+            <a:ext uri="{909E8E84-426E-40DD-AFC4-6F175D3DCCD1}">
+              <a14:hiddenFill xmlns:a14="http://schemas.microsoft.com/office/drawing/2010/main">
+                <a:solidFill>
+                  <a:schemeClr val="accent1"/>
+                </a:solidFill>
+              </a14:hiddenFill>
+            </a:ext>
+            <a:ext uri="{91240B29-F687-4F45-9708-019B960494DF}">
+              <a14:hiddenLine xmlns:a14="http://schemas.microsoft.com/office/drawing/2010/main" w="9525">
+                <a:solidFill>
+                  <a:schemeClr val="tx1"/>
+                </a:solidFill>
+                <a:miter lim="800000"/>
+                <a:headEnd/>
+                <a:tailEnd/>
+              </a14:hiddenLine>
+            </a:ext>
+            <a:ext uri="{AF507438-7753-43E0-B8FC-AC1667EBCBE1}">
+              <a14:hiddenEffects xmlns:a14="http://schemas.microsoft.com/office/drawing/2010/main">
+                <a:effectLst>
+                  <a:outerShdw dist="35921" dir="2700000" algn="ctr" rotWithShape="0">
+                    <a:schemeClr val="bg2"/>
+                  </a:outerShdw>
+                </a:effectLst>
+              </a14:hiddenEffects>
+            </a:ext>
+          </a:extLst>
+        </p:spPr>
+        <p:txBody>
+          <a:bodyPr vert="horz" wrap="square" lIns="91440" tIns="45720" rIns="91440" bIns="45720" numCol="1" anchor="ctr" anchorCtr="0" compatLnSpc="1">
+            <a:prstTxWarp prst="textNoShape">
+              <a:avLst/>
+            </a:prstTxWarp>
+            <a:spAutoFit/>
+          </a:bodyPr>
           <a:lstStyle/>
           <a:p>
-            <a:endParaRPr lang="zh-CN" altLang="en-US"/>
+            <a:pPr marL="0" lvl="0" indent="0" eaLnBrk="0" fontAlgn="base" hangingPunct="0">
+              <a:lnSpc>
+                <a:spcPct val="100000"/>
+              </a:lnSpc>
+              <a:spcBef>
+                <a:spcPct val="0"/>
+              </a:spcBef>
+              <a:spcAft>
+                <a:spcPct val="0"/>
+              </a:spcAft>
+              <a:buClrTx/>
+              <a:buNone/>
+            </a:pPr>
+            <a:r>
+              <a:rPr kumimoji="0" lang="zh-CN" altLang="zh-CN" sz="1600" b="0" i="0" u="none" strike="noStrike" cap="none" normalizeH="0" baseline="0" dirty="0" smtClean="0">
+                <a:ln>
+                  <a:noFill/>
+                </a:ln>
+                <a:solidFill>
+                  <a:srgbClr val="006000"/>
+                </a:solidFill>
+                <a:effectLst/>
+                <a:latin typeface="Arial Unicode MS" panose="020B0604020202020204" pitchFamily="34" charset="-122"/>
+              </a:rPr>
+              <a:t>android {</a:t>
+            </a:r>
+            <a:r>
+              <a:rPr kumimoji="0" lang="zh-CN" altLang="zh-CN" sz="1600" b="0" i="0" u="none" strike="noStrike" cap="none" normalizeH="0" baseline="0" dirty="0" smtClean="0">
+                <a:ln>
+                  <a:noFill/>
+                </a:ln>
+                <a:solidFill>
+                  <a:schemeClr val="tx1"/>
+                </a:solidFill>
+                <a:effectLst/>
+              </a:rPr>
+              <a:t/>
+            </a:r>
+            <a:br>
+              <a:rPr kumimoji="0" lang="zh-CN" altLang="zh-CN" sz="1600" b="0" i="0" u="none" strike="noStrike" cap="none" normalizeH="0" baseline="0" dirty="0" smtClean="0">
+                <a:ln>
+                  <a:noFill/>
+                </a:ln>
+                <a:solidFill>
+                  <a:schemeClr val="tx1"/>
+                </a:solidFill>
+                <a:effectLst/>
+              </a:rPr>
+            </a:br>
+            <a:r>
+              <a:rPr kumimoji="0" lang="zh-CN" altLang="zh-CN" sz="1600" b="0" i="0" u="none" strike="noStrike" cap="none" normalizeH="0" baseline="0" dirty="0" smtClean="0">
+                <a:ln>
+                  <a:noFill/>
+                </a:ln>
+                <a:solidFill>
+                  <a:srgbClr val="006000"/>
+                </a:solidFill>
+                <a:effectLst/>
+                <a:latin typeface="Arial Unicode MS" panose="020B0604020202020204" pitchFamily="34" charset="-122"/>
+              </a:rPr>
+              <a:t>    ....</a:t>
+            </a:r>
+            <a:r>
+              <a:rPr kumimoji="0" lang="zh-CN" altLang="zh-CN" sz="1600" b="0" i="0" u="none" strike="noStrike" cap="none" normalizeH="0" baseline="0" dirty="0" smtClean="0">
+                <a:ln>
+                  <a:noFill/>
+                </a:ln>
+                <a:solidFill>
+                  <a:schemeClr val="tx1"/>
+                </a:solidFill>
+                <a:effectLst/>
+              </a:rPr>
+              <a:t/>
+            </a:r>
+            <a:br>
+              <a:rPr kumimoji="0" lang="zh-CN" altLang="zh-CN" sz="1600" b="0" i="0" u="none" strike="noStrike" cap="none" normalizeH="0" baseline="0" dirty="0" smtClean="0">
+                <a:ln>
+                  <a:noFill/>
+                </a:ln>
+                <a:solidFill>
+                  <a:schemeClr val="tx1"/>
+                </a:solidFill>
+                <a:effectLst/>
+              </a:rPr>
+            </a:br>
+            <a:r>
+              <a:rPr kumimoji="0" lang="zh-CN" altLang="zh-CN" sz="1600" b="0" i="0" u="none" strike="noStrike" cap="none" normalizeH="0" baseline="0" dirty="0" smtClean="0">
+                <a:ln>
+                  <a:noFill/>
+                </a:ln>
+                <a:solidFill>
+                  <a:schemeClr val="tx1"/>
+                </a:solidFill>
+                <a:effectLst/>
+                <a:latin typeface="Arial" panose="020B0604020202020204" pitchFamily="34" charset="0"/>
+              </a:rPr>
+              <a:t/>
+            </a:r>
+            <a:br>
+              <a:rPr kumimoji="0" lang="zh-CN" altLang="zh-CN" sz="1600" b="0" i="0" u="none" strike="noStrike" cap="none" normalizeH="0" baseline="0" dirty="0" smtClean="0">
+                <a:ln>
+                  <a:noFill/>
+                </a:ln>
+                <a:solidFill>
+                  <a:schemeClr val="tx1"/>
+                </a:solidFill>
+                <a:effectLst/>
+                <a:latin typeface="Arial" panose="020B0604020202020204" pitchFamily="34" charset="0"/>
+              </a:rPr>
+            </a:br>
+            <a:r>
+              <a:rPr kumimoji="0" lang="zh-CN" altLang="zh-CN" sz="1600" b="0" i="0" u="none" strike="noStrike" cap="none" normalizeH="0" baseline="0" dirty="0" smtClean="0">
+                <a:ln>
+                  <a:noFill/>
+                </a:ln>
+                <a:solidFill>
+                  <a:schemeClr val="tx1"/>
+                </a:solidFill>
+                <a:effectLst/>
+                <a:latin typeface="Arial" panose="020B0604020202020204" pitchFamily="34" charset="0"/>
+              </a:rPr>
+              <a:t/>
+            </a:r>
+            <a:br>
+              <a:rPr kumimoji="0" lang="zh-CN" altLang="zh-CN" sz="1600" b="0" i="0" u="none" strike="noStrike" cap="none" normalizeH="0" baseline="0" dirty="0" smtClean="0">
+                <a:ln>
+                  <a:noFill/>
+                </a:ln>
+                <a:solidFill>
+                  <a:schemeClr val="tx1"/>
+                </a:solidFill>
+                <a:effectLst/>
+                <a:latin typeface="Arial" panose="020B0604020202020204" pitchFamily="34" charset="0"/>
+              </a:rPr>
+            </a:br>
+            <a:r>
+              <a:rPr kumimoji="0" lang="zh-CN" altLang="zh-CN" sz="1600" b="0" i="0" u="none" strike="noStrike" cap="none" normalizeH="0" baseline="0" dirty="0" smtClean="0">
+                <a:ln>
+                  <a:noFill/>
+                </a:ln>
+                <a:solidFill>
+                  <a:srgbClr val="006000"/>
+                </a:solidFill>
+                <a:effectLst/>
+                <a:latin typeface="Arial Unicode MS" panose="020B0604020202020204" pitchFamily="34" charset="-122"/>
+              </a:rPr>
+              <a:t>    productFlavors {</a:t>
+            </a:r>
+            <a:r>
+              <a:rPr kumimoji="0" lang="zh-CN" altLang="zh-CN" sz="1600" b="0" i="0" u="none" strike="noStrike" cap="none" normalizeH="0" baseline="0" dirty="0" smtClean="0">
+                <a:ln>
+                  <a:noFill/>
+                </a:ln>
+                <a:solidFill>
+                  <a:schemeClr val="tx1"/>
+                </a:solidFill>
+                <a:effectLst/>
+              </a:rPr>
+              <a:t/>
+            </a:r>
+            <a:br>
+              <a:rPr kumimoji="0" lang="zh-CN" altLang="zh-CN" sz="1600" b="0" i="0" u="none" strike="noStrike" cap="none" normalizeH="0" baseline="0" dirty="0" smtClean="0">
+                <a:ln>
+                  <a:noFill/>
+                </a:ln>
+                <a:solidFill>
+                  <a:schemeClr val="tx1"/>
+                </a:solidFill>
+                <a:effectLst/>
+              </a:rPr>
+            </a:br>
+            <a:r>
+              <a:rPr kumimoji="0" lang="zh-CN" altLang="zh-CN" sz="1600" b="0" i="0" u="none" strike="noStrike" cap="none" normalizeH="0" baseline="0" dirty="0" smtClean="0">
+                <a:ln>
+                  <a:noFill/>
+                </a:ln>
+                <a:solidFill>
+                  <a:srgbClr val="006000"/>
+                </a:solidFill>
+                <a:effectLst/>
+                <a:latin typeface="Arial Unicode MS" panose="020B0604020202020204" pitchFamily="34" charset="-122"/>
+              </a:rPr>
+              <a:t>        </a:t>
+            </a:r>
+            <a:r>
+              <a:rPr lang="en-US" altLang="zh-CN" sz="1600" cap="none" dirty="0" err="1" smtClean="0">
+                <a:solidFill>
+                  <a:srgbClr val="006000"/>
+                </a:solidFill>
+                <a:latin typeface="Arial Unicode MS" panose="020B0604020202020204" pitchFamily="34" charset="-122"/>
+              </a:rPr>
+              <a:t>flavor_maven</a:t>
+            </a:r>
+            <a:r>
+              <a:rPr kumimoji="0" lang="zh-CN" altLang="zh-CN" sz="1600" b="0" i="0" u="none" strike="noStrike" cap="none" normalizeH="0" baseline="0" dirty="0" smtClean="0">
+                <a:ln>
+                  <a:noFill/>
+                </a:ln>
+                <a:solidFill>
+                  <a:srgbClr val="006000"/>
+                </a:solidFill>
+                <a:effectLst/>
+                <a:latin typeface="Arial Unicode MS" panose="020B0604020202020204" pitchFamily="34" charset="-122"/>
+              </a:rPr>
+              <a:t> {</a:t>
+            </a:r>
+            <a:r>
+              <a:rPr kumimoji="0" lang="zh-CN" altLang="zh-CN" sz="1600" b="0" i="0" u="none" strike="noStrike" cap="none" normalizeH="0" baseline="0" dirty="0" smtClean="0">
+                <a:ln>
+                  <a:noFill/>
+                </a:ln>
+                <a:solidFill>
+                  <a:schemeClr val="tx1"/>
+                </a:solidFill>
+                <a:effectLst/>
+              </a:rPr>
+              <a:t/>
+            </a:r>
+            <a:br>
+              <a:rPr kumimoji="0" lang="zh-CN" altLang="zh-CN" sz="1600" b="0" i="0" u="none" strike="noStrike" cap="none" normalizeH="0" baseline="0" dirty="0" smtClean="0">
+                <a:ln>
+                  <a:noFill/>
+                </a:ln>
+                <a:solidFill>
+                  <a:schemeClr val="tx1"/>
+                </a:solidFill>
+                <a:effectLst/>
+              </a:rPr>
+            </a:br>
+            <a:r>
+              <a:rPr kumimoji="0" lang="zh-CN" altLang="zh-CN" sz="1600" b="0" i="0" u="none" strike="noStrike" cap="none" normalizeH="0" baseline="0" dirty="0" smtClean="0">
+                <a:ln>
+                  <a:noFill/>
+                </a:ln>
+                <a:solidFill>
+                  <a:srgbClr val="006000"/>
+                </a:solidFill>
+                <a:effectLst/>
+                <a:latin typeface="Arial Unicode MS" panose="020B0604020202020204" pitchFamily="34" charset="-122"/>
+              </a:rPr>
+              <a:t>            ...</a:t>
+            </a:r>
+            <a:r>
+              <a:rPr kumimoji="0" lang="zh-CN" altLang="zh-CN" sz="1600" b="0" i="0" u="none" strike="noStrike" cap="none" normalizeH="0" baseline="0" dirty="0" smtClean="0">
+                <a:ln>
+                  <a:noFill/>
+                </a:ln>
+                <a:solidFill>
+                  <a:schemeClr val="tx1"/>
+                </a:solidFill>
+                <a:effectLst/>
+              </a:rPr>
+              <a:t/>
+            </a:r>
+            <a:br>
+              <a:rPr kumimoji="0" lang="zh-CN" altLang="zh-CN" sz="1600" b="0" i="0" u="none" strike="noStrike" cap="none" normalizeH="0" baseline="0" dirty="0" smtClean="0">
+                <a:ln>
+                  <a:noFill/>
+                </a:ln>
+                <a:solidFill>
+                  <a:schemeClr val="tx1"/>
+                </a:solidFill>
+                <a:effectLst/>
+              </a:rPr>
+            </a:br>
+            <a:r>
+              <a:rPr kumimoji="0" lang="zh-CN" altLang="zh-CN" sz="1600" b="0" i="0" u="none" strike="noStrike" cap="none" normalizeH="0" baseline="0" dirty="0" smtClean="0">
+                <a:ln>
+                  <a:noFill/>
+                </a:ln>
+                <a:solidFill>
+                  <a:srgbClr val="006000"/>
+                </a:solidFill>
+                <a:effectLst/>
+                <a:latin typeface="Arial Unicode MS" panose="020B0604020202020204" pitchFamily="34" charset="-122"/>
+              </a:rPr>
+              <a:t>        }</a:t>
+            </a:r>
+            <a:r>
+              <a:rPr kumimoji="0" lang="zh-CN" altLang="zh-CN" sz="1600" b="0" i="0" u="none" strike="noStrike" cap="none" normalizeH="0" baseline="0" dirty="0" smtClean="0">
+                <a:ln>
+                  <a:noFill/>
+                </a:ln>
+                <a:solidFill>
+                  <a:schemeClr val="tx1"/>
+                </a:solidFill>
+                <a:effectLst/>
+              </a:rPr>
+              <a:t/>
+            </a:r>
+            <a:br>
+              <a:rPr kumimoji="0" lang="zh-CN" altLang="zh-CN" sz="1600" b="0" i="0" u="none" strike="noStrike" cap="none" normalizeH="0" baseline="0" dirty="0" smtClean="0">
+                <a:ln>
+                  <a:noFill/>
+                </a:ln>
+                <a:solidFill>
+                  <a:schemeClr val="tx1"/>
+                </a:solidFill>
+                <a:effectLst/>
+              </a:rPr>
+            </a:br>
+            <a:r>
+              <a:rPr kumimoji="0" lang="zh-CN" altLang="zh-CN" sz="1600" b="0" i="0" u="none" strike="noStrike" cap="none" normalizeH="0" baseline="0" dirty="0" smtClean="0">
+                <a:ln>
+                  <a:noFill/>
+                </a:ln>
+                <a:solidFill>
+                  <a:srgbClr val="006000"/>
+                </a:solidFill>
+                <a:effectLst/>
+                <a:latin typeface="Arial Unicode MS" panose="020B0604020202020204" pitchFamily="34" charset="-122"/>
+              </a:rPr>
+              <a:t>    }</a:t>
+            </a:r>
+            <a:r>
+              <a:rPr kumimoji="0" lang="zh-CN" altLang="zh-CN" sz="1600" b="0" i="0" u="none" strike="noStrike" cap="none" normalizeH="0" baseline="0" dirty="0" smtClean="0">
+                <a:ln>
+                  <a:noFill/>
+                </a:ln>
+                <a:solidFill>
+                  <a:schemeClr val="tx1"/>
+                </a:solidFill>
+                <a:effectLst/>
+              </a:rPr>
+              <a:t/>
+            </a:r>
+            <a:br>
+              <a:rPr kumimoji="0" lang="zh-CN" altLang="zh-CN" sz="1600" b="0" i="0" u="none" strike="noStrike" cap="none" normalizeH="0" baseline="0" dirty="0" smtClean="0">
+                <a:ln>
+                  <a:noFill/>
+                </a:ln>
+                <a:solidFill>
+                  <a:schemeClr val="tx1"/>
+                </a:solidFill>
+                <a:effectLst/>
+              </a:rPr>
+            </a:br>
+            <a:r>
+              <a:rPr kumimoji="0" lang="zh-CN" altLang="zh-CN" sz="1600" b="0" i="0" u="none" strike="noStrike" cap="none" normalizeH="0" baseline="0" dirty="0" smtClean="0">
+                <a:ln>
+                  <a:noFill/>
+                </a:ln>
+                <a:solidFill>
+                  <a:srgbClr val="006000"/>
+                </a:solidFill>
+                <a:effectLst/>
+                <a:latin typeface="Arial Unicode MS" panose="020B0604020202020204" pitchFamily="34" charset="-122"/>
+              </a:rPr>
+              <a:t>}</a:t>
+            </a:r>
+            <a:r>
+              <a:rPr kumimoji="0" lang="zh-CN" altLang="zh-CN" sz="1600" b="0" i="0" u="none" strike="noStrike" cap="none" normalizeH="0" baseline="0" dirty="0" smtClean="0">
+                <a:ln>
+                  <a:noFill/>
+                </a:ln>
+                <a:solidFill>
+                  <a:schemeClr val="tx1"/>
+                </a:solidFill>
+                <a:effectLst/>
+              </a:rPr>
+              <a:t> </a:t>
+            </a:r>
+            <a:endParaRPr kumimoji="0" lang="zh-CN" altLang="zh-CN" sz="1600" b="0" i="0" u="none" strike="noStrike" cap="none" normalizeH="0" baseline="0" dirty="0" smtClean="0">
+              <a:ln>
+                <a:noFill/>
+              </a:ln>
+              <a:solidFill>
+                <a:schemeClr val="tx1"/>
+              </a:solidFill>
+              <a:effectLst/>
+              <a:latin typeface="Arial" panose="020B0604020202020204" pitchFamily="34" charset="0"/>
+            </a:endParaRPr>
+          </a:p>
+        </p:txBody>
+      </p:sp>
+      <p:sp>
+        <p:nvSpPr>
+          <p:cNvPr id="5" name="矩形 4"/>
+          <p:cNvSpPr/>
+          <p:nvPr/>
+        </p:nvSpPr>
+        <p:spPr>
+          <a:xfrm>
+            <a:off x="3065319" y="1604478"/>
+            <a:ext cx="2608117" cy="3416320"/>
+          </a:xfrm>
+          <a:prstGeom prst="rect">
+            <a:avLst/>
+          </a:prstGeom>
+        </p:spPr>
+        <p:txBody>
+          <a:bodyPr wrap="square">
+            <a:spAutoFit/>
+          </a:bodyPr>
+          <a:lstStyle/>
+          <a:p>
+            <a:r>
+              <a:rPr lang="en-US" altLang="zh-CN" dirty="0" err="1" smtClean="0"/>
+              <a:t>AndroidTest</a:t>
+            </a:r>
+            <a:endParaRPr lang="en-US" altLang="zh-CN" dirty="0" smtClean="0"/>
+          </a:p>
+          <a:p>
+            <a:r>
+              <a:rPr lang="en-US" altLang="zh-CN" dirty="0" err="1" smtClean="0"/>
+              <a:t>AndroidTestFlavor_maven</a:t>
+            </a:r>
+            <a:endParaRPr lang="en-US" altLang="zh-CN" dirty="0" smtClean="0"/>
+          </a:p>
+          <a:p>
+            <a:endParaRPr lang="en-US" altLang="zh-CN" dirty="0"/>
+          </a:p>
+          <a:p>
+            <a:r>
+              <a:rPr lang="en-US" altLang="zh-CN" dirty="0"/>
+              <a:t>main</a:t>
+            </a:r>
+          </a:p>
+          <a:p>
+            <a:r>
+              <a:rPr lang="en-US" altLang="zh-CN" dirty="0"/>
+              <a:t>Debug</a:t>
+            </a:r>
+          </a:p>
+          <a:p>
+            <a:r>
+              <a:rPr lang="en-US" altLang="zh-CN" dirty="0"/>
+              <a:t>Release</a:t>
+            </a:r>
+          </a:p>
+          <a:p>
+            <a:r>
+              <a:rPr lang="en-US" altLang="zh-CN" dirty="0" err="1" smtClean="0"/>
+              <a:t>debug_ant</a:t>
+            </a:r>
+            <a:endParaRPr lang="en-US" altLang="zh-CN" dirty="0" smtClean="0"/>
+          </a:p>
+          <a:p>
+            <a:endParaRPr lang="en-US" altLang="zh-CN" dirty="0"/>
+          </a:p>
+          <a:p>
+            <a:r>
+              <a:rPr lang="en-US" altLang="zh-CN" dirty="0" err="1" smtClean="0"/>
+              <a:t>Flavor_maven</a:t>
+            </a:r>
+            <a:endParaRPr lang="en-US" altLang="zh-CN" dirty="0" smtClean="0"/>
+          </a:p>
+          <a:p>
+            <a:r>
+              <a:rPr lang="en-US" altLang="zh-CN" dirty="0" err="1" smtClean="0"/>
+              <a:t>Flavor_mavenDebug</a:t>
+            </a:r>
+            <a:endParaRPr lang="en-US" altLang="zh-CN" dirty="0" smtClean="0"/>
+          </a:p>
+          <a:p>
+            <a:r>
+              <a:rPr lang="en-US" altLang="zh-CN" dirty="0" err="1" smtClean="0"/>
+              <a:t>Flavor_mavenRelease</a:t>
+            </a:r>
+            <a:endParaRPr lang="en-US" altLang="zh-CN" dirty="0" smtClean="0"/>
+          </a:p>
+          <a:p>
+            <a:r>
+              <a:rPr lang="en-US" altLang="zh-CN" dirty="0" err="1" smtClean="0"/>
+              <a:t>Flavor_mavenDebug_ant</a:t>
+            </a:r>
+            <a:endParaRPr lang="en-US" altLang="zh-CN" dirty="0"/>
+          </a:p>
+        </p:txBody>
+      </p:sp>
+      <p:sp>
+        <p:nvSpPr>
+          <p:cNvPr id="6" name="矩形 5"/>
+          <p:cNvSpPr/>
+          <p:nvPr/>
+        </p:nvSpPr>
+        <p:spPr>
+          <a:xfrm>
+            <a:off x="5808519" y="2158476"/>
+            <a:ext cx="2815936" cy="2862322"/>
+          </a:xfrm>
+          <a:prstGeom prst="rect">
+            <a:avLst/>
+          </a:prstGeom>
+        </p:spPr>
+        <p:txBody>
+          <a:bodyPr wrap="square">
+            <a:spAutoFit/>
+          </a:bodyPr>
+          <a:lstStyle/>
+          <a:p>
+            <a:endParaRPr lang="en-US" altLang="zh-CN" dirty="0"/>
+          </a:p>
+          <a:p>
+            <a:r>
+              <a:rPr lang="en-US" altLang="zh-CN" dirty="0"/>
+              <a:t>test</a:t>
+            </a:r>
+          </a:p>
+          <a:p>
+            <a:r>
+              <a:rPr lang="en-US" altLang="zh-CN" dirty="0" err="1"/>
+              <a:t>testDebug</a:t>
+            </a:r>
+            <a:endParaRPr lang="en-US" altLang="zh-CN" dirty="0"/>
+          </a:p>
+          <a:p>
+            <a:r>
+              <a:rPr lang="en-US" altLang="zh-CN" dirty="0" err="1"/>
+              <a:t>testRelease</a:t>
+            </a:r>
+            <a:endParaRPr lang="en-US" altLang="zh-CN" dirty="0"/>
+          </a:p>
+          <a:p>
+            <a:r>
+              <a:rPr lang="en-US" altLang="zh-CN" dirty="0" err="1"/>
+              <a:t>testDebug_ant</a:t>
+            </a:r>
+            <a:endParaRPr lang="zh-CN" altLang="en-US" dirty="0"/>
+          </a:p>
+          <a:p>
+            <a:endParaRPr lang="en-US" altLang="zh-CN" dirty="0"/>
+          </a:p>
+          <a:p>
+            <a:r>
+              <a:rPr lang="en-US" altLang="zh-CN" dirty="0" err="1" smtClean="0"/>
+              <a:t>testFlavor_maven</a:t>
+            </a:r>
+            <a:endParaRPr lang="en-US" altLang="zh-CN" dirty="0" smtClean="0"/>
+          </a:p>
+          <a:p>
+            <a:r>
+              <a:rPr lang="en-US" altLang="zh-CN" dirty="0" err="1" smtClean="0"/>
+              <a:t>testFlavor_mavenDebug</a:t>
+            </a:r>
+            <a:endParaRPr lang="en-US" altLang="zh-CN" dirty="0" smtClean="0"/>
+          </a:p>
+          <a:p>
+            <a:r>
+              <a:rPr lang="en-US" altLang="zh-CN" dirty="0" err="1" smtClean="0"/>
+              <a:t>testFlavor_mavenRelease</a:t>
+            </a:r>
+            <a:endParaRPr lang="en-US" altLang="zh-CN" dirty="0" smtClean="0"/>
+          </a:p>
+          <a:p>
+            <a:r>
+              <a:rPr lang="en-US" altLang="zh-CN" dirty="0" err="1" smtClean="0"/>
+              <a:t>testFlavor_mavenDebug_ant</a:t>
+            </a:r>
+            <a:endParaRPr lang="en-US" altLang="zh-CN" dirty="0"/>
           </a:p>
         </p:txBody>
       </p:sp>
@@ -7744,7 +9052,7 @@
       </p:grpSpPr>
       <p:sp>
         <p:nvSpPr>
-          <p:cNvPr id="5" name="标题 4"/>
+          <p:cNvPr id="2" name="标题 1"/>
           <p:cNvSpPr>
             <a:spLocks noGrp="1"/>
           </p:cNvSpPr>
@@ -7758,6 +9066,714 @@
           <a:lstStyle/>
           <a:p>
             <a:r>
+              <a:rPr lang="en-US" altLang="zh-CN" dirty="0" smtClean="0"/>
+              <a:t>5.BuildConfig</a:t>
+            </a:r>
+            <a:endParaRPr lang="zh-CN" altLang="en-US" dirty="0"/>
+          </a:p>
+        </p:txBody>
+      </p:sp>
+      <p:sp>
+        <p:nvSpPr>
+          <p:cNvPr id="3" name="内容占位符 2"/>
+          <p:cNvSpPr>
+            <a:spLocks noGrp="1"/>
+          </p:cNvSpPr>
+          <p:nvPr>
+            <p:ph sz="quarter" idx="13"/>
+          </p:nvPr>
+        </p:nvSpPr>
+        <p:spPr>
+          <a:xfrm>
+            <a:off x="685331" y="1582221"/>
+            <a:ext cx="3730806" cy="4208980"/>
+          </a:xfrm>
+        </p:spPr>
+        <p:txBody>
+          <a:bodyPr>
+            <a:normAutofit/>
+          </a:bodyPr>
+          <a:lstStyle/>
+          <a:p>
+            <a:pPr marL="0" indent="0">
+              <a:buNone/>
+            </a:pPr>
+            <a:r>
+              <a:rPr lang="en-US" altLang="zh-CN" sz="1600" cap="none" dirty="0" err="1">
+                <a:solidFill>
+                  <a:srgbClr val="006000"/>
+                </a:solidFill>
+                <a:latin typeface="Arial Unicode MS" panose="020B0604020202020204" pitchFamily="34" charset="-122"/>
+              </a:rPr>
+              <a:t>flavor_gradle</a:t>
+            </a:r>
+            <a:r>
+              <a:rPr lang="en-US" altLang="zh-CN" sz="1600" cap="none" dirty="0">
+                <a:solidFill>
+                  <a:srgbClr val="006000"/>
+                </a:solidFill>
+                <a:latin typeface="Arial Unicode MS" panose="020B0604020202020204" pitchFamily="34" charset="-122"/>
+              </a:rPr>
+              <a:t> {</a:t>
+            </a:r>
+          </a:p>
+          <a:p>
+            <a:pPr marL="0" indent="0">
+              <a:buNone/>
+            </a:pPr>
+            <a:r>
+              <a:rPr lang="en-US" altLang="zh-CN" sz="1600" cap="none" dirty="0" err="1" smtClean="0">
+                <a:solidFill>
+                  <a:srgbClr val="006000"/>
+                </a:solidFill>
+                <a:latin typeface="Arial Unicode MS" panose="020B0604020202020204" pitchFamily="34" charset="-122"/>
+              </a:rPr>
+              <a:t>applicationid</a:t>
+            </a:r>
+            <a:r>
+              <a:rPr lang="en-US" altLang="zh-CN" sz="1600" cap="none" dirty="0" smtClean="0">
+                <a:solidFill>
+                  <a:srgbClr val="006000"/>
+                </a:solidFill>
+                <a:latin typeface="Arial Unicode MS" panose="020B0604020202020204" pitchFamily="34" charset="-122"/>
+              </a:rPr>
+              <a:t> </a:t>
+            </a:r>
+            <a:r>
+              <a:rPr lang="en-US" altLang="zh-CN" sz="1600" cap="none" dirty="0">
+                <a:solidFill>
+                  <a:srgbClr val="006000"/>
+                </a:solidFill>
+                <a:latin typeface="Arial Unicode MS" panose="020B0604020202020204" pitchFamily="34" charset="-122"/>
+              </a:rPr>
+              <a:t>"</a:t>
+            </a:r>
+            <a:r>
+              <a:rPr lang="en-US" altLang="zh-CN" sz="1600" cap="none" dirty="0" err="1">
+                <a:solidFill>
+                  <a:srgbClr val="006000"/>
+                </a:solidFill>
+                <a:latin typeface="Arial Unicode MS" panose="020B0604020202020204" pitchFamily="34" charset="-122"/>
+              </a:rPr>
+              <a:t>com.arcsoft.gradle</a:t>
+            </a:r>
+            <a:r>
+              <a:rPr lang="en-US" altLang="zh-CN" sz="1600" cap="none" dirty="0">
+                <a:solidFill>
+                  <a:srgbClr val="006000"/>
+                </a:solidFill>
+                <a:latin typeface="Arial Unicode MS" panose="020B0604020202020204" pitchFamily="34" charset="-122"/>
+              </a:rPr>
+              <a:t>"</a:t>
+            </a:r>
+          </a:p>
+          <a:p>
+            <a:pPr marL="0" indent="0">
+              <a:buNone/>
+            </a:pPr>
+            <a:r>
+              <a:rPr lang="en-US" altLang="zh-CN" sz="1600" cap="none" dirty="0" err="1" smtClean="0">
+                <a:solidFill>
+                  <a:srgbClr val="006000"/>
+                </a:solidFill>
+                <a:latin typeface="Arial Unicode MS" panose="020B0604020202020204" pitchFamily="34" charset="-122"/>
+              </a:rPr>
+              <a:t>buildconfigfield</a:t>
+            </a:r>
+            <a:r>
+              <a:rPr lang="en-US" altLang="zh-CN" sz="1600" cap="none" dirty="0" smtClean="0">
+                <a:solidFill>
+                  <a:srgbClr val="006000"/>
+                </a:solidFill>
+                <a:latin typeface="Arial Unicode MS" panose="020B0604020202020204" pitchFamily="34" charset="-122"/>
+              </a:rPr>
+              <a:t> </a:t>
+            </a:r>
+            <a:r>
+              <a:rPr lang="en-US" altLang="zh-CN" sz="1600" cap="none" dirty="0">
+                <a:solidFill>
+                  <a:srgbClr val="006000"/>
+                </a:solidFill>
+                <a:latin typeface="Arial Unicode MS" panose="020B0604020202020204" pitchFamily="34" charset="-122"/>
+              </a:rPr>
+              <a:t>"</a:t>
+            </a:r>
+            <a:r>
+              <a:rPr lang="en-US" altLang="zh-CN" sz="1600" cap="none" dirty="0" err="1">
+                <a:solidFill>
+                  <a:srgbClr val="006000"/>
+                </a:solidFill>
+                <a:latin typeface="Arial Unicode MS" panose="020B0604020202020204" pitchFamily="34" charset="-122"/>
+              </a:rPr>
+              <a:t>int</a:t>
+            </a:r>
+            <a:r>
+              <a:rPr lang="en-US" altLang="zh-CN" sz="1600" cap="none" dirty="0">
+                <a:solidFill>
+                  <a:srgbClr val="006000"/>
+                </a:solidFill>
+                <a:latin typeface="Arial Unicode MS" panose="020B0604020202020204" pitchFamily="34" charset="-122"/>
+              </a:rPr>
+              <a:t>", "</a:t>
+            </a:r>
+            <a:r>
+              <a:rPr lang="en-US" altLang="zh-CN" sz="1600" cap="none" dirty="0" err="1">
+                <a:solidFill>
+                  <a:srgbClr val="006000"/>
+                </a:solidFill>
+                <a:latin typeface="Arial Unicode MS" panose="020B0604020202020204" pitchFamily="34" charset="-122"/>
+              </a:rPr>
+              <a:t>show_gradle</a:t>
+            </a:r>
+            <a:r>
+              <a:rPr lang="en-US" altLang="zh-CN" sz="1600" cap="none" dirty="0">
+                <a:solidFill>
+                  <a:srgbClr val="006000"/>
+                </a:solidFill>
+                <a:latin typeface="Arial Unicode MS" panose="020B0604020202020204" pitchFamily="34" charset="-122"/>
+              </a:rPr>
+              <a:t>", "1"</a:t>
+            </a:r>
+          </a:p>
+          <a:p>
+            <a:pPr marL="0" indent="0">
+              <a:buNone/>
+            </a:pPr>
+            <a:r>
+              <a:rPr lang="en-US" altLang="zh-CN" sz="1600" cap="none" dirty="0">
+                <a:solidFill>
+                  <a:srgbClr val="006000"/>
+                </a:solidFill>
+                <a:latin typeface="Arial Unicode MS" panose="020B0604020202020204" pitchFamily="34" charset="-122"/>
+              </a:rPr>
+              <a:t>		</a:t>
+            </a:r>
+            <a:r>
+              <a:rPr lang="en-US" altLang="zh-CN" sz="1600" cap="none" dirty="0" smtClean="0">
+                <a:solidFill>
+                  <a:srgbClr val="006000"/>
+                </a:solidFill>
+                <a:latin typeface="Arial Unicode MS" panose="020B0604020202020204" pitchFamily="34" charset="-122"/>
+              </a:rPr>
+              <a:t>}</a:t>
+            </a:r>
+          </a:p>
+          <a:p>
+            <a:pPr marL="0" indent="0">
+              <a:buNone/>
+            </a:pPr>
+            <a:endParaRPr lang="en-US" altLang="zh-CN" sz="1600" cap="none" dirty="0">
+              <a:solidFill>
+                <a:srgbClr val="006000"/>
+              </a:solidFill>
+              <a:latin typeface="Arial Unicode MS" panose="020B0604020202020204" pitchFamily="34" charset="-122"/>
+            </a:endParaRPr>
+          </a:p>
+          <a:p>
+            <a:pPr marL="0" indent="0">
+              <a:buNone/>
+            </a:pPr>
+            <a:r>
+              <a:rPr lang="en-US" altLang="zh-CN" sz="1600" cap="none" dirty="0" smtClean="0">
+                <a:solidFill>
+                  <a:srgbClr val="006000"/>
+                </a:solidFill>
+                <a:latin typeface="Arial Unicode MS" panose="020B0604020202020204" pitchFamily="34" charset="-122"/>
+              </a:rPr>
+              <a:t>In MainActivity.java</a:t>
+            </a:r>
+          </a:p>
+          <a:p>
+            <a:pPr marL="0" indent="0">
+              <a:buNone/>
+            </a:pPr>
+            <a:r>
+              <a:rPr lang="en-US" altLang="zh-CN" sz="1600" cap="none" dirty="0" smtClean="0">
+                <a:solidFill>
+                  <a:srgbClr val="006000"/>
+                </a:solidFill>
+                <a:latin typeface="Arial Unicode MS" panose="020B0604020202020204" pitchFamily="34" charset="-122"/>
+              </a:rPr>
+              <a:t>if </a:t>
+            </a:r>
+            <a:r>
+              <a:rPr lang="en-US" altLang="zh-CN" sz="1600" cap="none" dirty="0">
+                <a:solidFill>
+                  <a:srgbClr val="006000"/>
+                </a:solidFill>
+                <a:latin typeface="Arial Unicode MS" panose="020B0604020202020204" pitchFamily="34" charset="-122"/>
+              </a:rPr>
+              <a:t>(</a:t>
+            </a:r>
+            <a:r>
+              <a:rPr lang="en-US" altLang="zh-CN" sz="1600" cap="none" dirty="0" err="1">
+                <a:solidFill>
+                  <a:srgbClr val="006000"/>
+                </a:solidFill>
+                <a:latin typeface="Arial Unicode MS" panose="020B0604020202020204" pitchFamily="34" charset="-122"/>
+              </a:rPr>
+              <a:t>BuildConfig.SHOW_GRADLE</a:t>
+            </a:r>
+            <a:r>
+              <a:rPr lang="en-US" altLang="zh-CN" sz="1600" cap="none" dirty="0">
+                <a:solidFill>
+                  <a:srgbClr val="006000"/>
+                </a:solidFill>
+                <a:latin typeface="Arial Unicode MS" panose="020B0604020202020204" pitchFamily="34" charset="-122"/>
+              </a:rPr>
+              <a:t> == 1) </a:t>
+            </a:r>
+            <a:r>
+              <a:rPr lang="en-US" altLang="zh-CN" sz="1600" cap="none" dirty="0" smtClean="0">
+                <a:solidFill>
+                  <a:srgbClr val="006000"/>
+                </a:solidFill>
+                <a:latin typeface="Arial Unicode MS" panose="020B0604020202020204" pitchFamily="34" charset="-122"/>
+              </a:rPr>
+              <a:t>{</a:t>
+            </a:r>
+          </a:p>
+          <a:p>
+            <a:pPr marL="0" indent="0">
+              <a:buNone/>
+            </a:pPr>
+            <a:r>
+              <a:rPr lang="en-US" altLang="zh-CN" sz="1600" cap="none" dirty="0" smtClean="0">
+                <a:solidFill>
+                  <a:srgbClr val="006000"/>
+                </a:solidFill>
+                <a:latin typeface="Arial Unicode MS" panose="020B0604020202020204" pitchFamily="34" charset="-122"/>
+              </a:rPr>
+              <a:t>	…</a:t>
+            </a:r>
+          </a:p>
+          <a:p>
+            <a:pPr marL="0" indent="0">
+              <a:buNone/>
+            </a:pPr>
+            <a:r>
+              <a:rPr lang="en-US" altLang="zh-CN" sz="1600" cap="none" dirty="0" smtClean="0">
+                <a:solidFill>
+                  <a:srgbClr val="006000"/>
+                </a:solidFill>
+                <a:latin typeface="Arial Unicode MS" panose="020B0604020202020204" pitchFamily="34" charset="-122"/>
+              </a:rPr>
+              <a:t>}</a:t>
+            </a:r>
+            <a:endParaRPr lang="zh-CN" altLang="en-US" sz="1600" cap="none" dirty="0">
+              <a:solidFill>
+                <a:srgbClr val="006000"/>
+              </a:solidFill>
+              <a:latin typeface="Arial Unicode MS" panose="020B0604020202020204" pitchFamily="34" charset="-122"/>
+            </a:endParaRPr>
+          </a:p>
+        </p:txBody>
+      </p:sp>
+      <p:sp>
+        <p:nvSpPr>
+          <p:cNvPr id="5" name="Rectangle 1"/>
+          <p:cNvSpPr>
+            <a:spLocks noChangeArrowheads="1"/>
+          </p:cNvSpPr>
+          <p:nvPr/>
+        </p:nvSpPr>
+        <p:spPr bwMode="auto">
+          <a:xfrm rot="10800000" flipV="1">
+            <a:off x="4416137" y="1582221"/>
+            <a:ext cx="4260273" cy="3693319"/>
+          </a:xfrm>
+          <a:prstGeom prst="rect">
+            <a:avLst/>
+          </a:prstGeom>
+          <a:solidFill>
+            <a:schemeClr val="bg1">
+              <a:lumMod val="85000"/>
+            </a:schemeClr>
+          </a:solidFill>
+          <a:ln>
+            <a:noFill/>
+          </a:ln>
+          <a:effectLst/>
+        </p:spPr>
+        <p:txBody>
+          <a:bodyPr vert="horz" wrap="square" lIns="91440" tIns="45720" rIns="91440" bIns="45720" numCol="1" anchor="ctr" anchorCtr="0" compatLnSpc="1">
+            <a:prstTxWarp prst="textNoShape">
+              <a:avLst/>
+            </a:prstTxWarp>
+            <a:spAutoFit/>
+          </a:bodyPr>
+          <a:lstStyle/>
+          <a:p>
+            <a:pPr marL="342900" marR="0" lvl="0" indent="-342900" algn="l" defTabSz="914400" rtl="0" eaLnBrk="0" fontAlgn="base" latinLnBrk="0" hangingPunct="0">
+              <a:lnSpc>
+                <a:spcPct val="150000"/>
+              </a:lnSpc>
+              <a:spcBef>
+                <a:spcPct val="0"/>
+              </a:spcBef>
+              <a:spcAft>
+                <a:spcPct val="0"/>
+              </a:spcAft>
+              <a:buClrTx/>
+              <a:buSzTx/>
+              <a:buFont typeface="+mj-lt"/>
+              <a:buAutoNum type="arabicPeriod"/>
+              <a:tabLst/>
+            </a:pPr>
+            <a:r>
+              <a:rPr kumimoji="0" lang="zh-CN" altLang="zh-CN" sz="1600" b="0" i="0" u="none" strike="noStrike" cap="none" normalizeH="0" baseline="0" dirty="0" smtClean="0">
+                <a:ln>
+                  <a:noFill/>
+                </a:ln>
+                <a:solidFill>
+                  <a:srgbClr val="006000"/>
+                </a:solidFill>
+                <a:effectLst/>
+                <a:latin typeface="Arial Unicode MS" panose="020B0604020202020204" pitchFamily="34" charset="-122"/>
+                <a:cs typeface="Arial" panose="020B0604020202020204" pitchFamily="34" charset="0"/>
+              </a:rPr>
+              <a:t>boolean DEBUG</a:t>
+            </a:r>
+            <a:r>
+              <a:rPr kumimoji="0" lang="zh-CN" altLang="zh-CN" sz="1600" b="0" i="0" u="none" strike="noStrike" cap="none" normalizeH="0" baseline="0" dirty="0" smtClean="0">
+                <a:ln>
+                  <a:noFill/>
+                </a:ln>
+                <a:solidFill>
+                  <a:srgbClr val="444444"/>
+                </a:solidFill>
+                <a:effectLst/>
+                <a:latin typeface="Arial" panose="020B0604020202020204" pitchFamily="34" charset="0"/>
+                <a:cs typeface="Arial" panose="020B0604020202020204" pitchFamily="34" charset="0"/>
+              </a:rPr>
+              <a:t> – if the build is debuggable</a:t>
+            </a:r>
+          </a:p>
+          <a:p>
+            <a:pPr marL="342900" marR="0" lvl="0" indent="-342900" algn="l" defTabSz="914400" rtl="0" eaLnBrk="0" fontAlgn="base" latinLnBrk="0" hangingPunct="0">
+              <a:lnSpc>
+                <a:spcPct val="150000"/>
+              </a:lnSpc>
+              <a:spcBef>
+                <a:spcPct val="0"/>
+              </a:spcBef>
+              <a:spcAft>
+                <a:spcPct val="0"/>
+              </a:spcAft>
+              <a:buClrTx/>
+              <a:buSzTx/>
+              <a:buFont typeface="+mj-lt"/>
+              <a:buAutoNum type="arabicPeriod"/>
+              <a:tabLst/>
+            </a:pPr>
+            <a:r>
+              <a:rPr kumimoji="0" lang="zh-CN" altLang="zh-CN" sz="1600" b="0" i="0" u="none" strike="noStrike" cap="none" normalizeH="0" baseline="0" dirty="0" smtClean="0">
+                <a:ln>
+                  <a:noFill/>
+                </a:ln>
+                <a:solidFill>
+                  <a:srgbClr val="006000"/>
+                </a:solidFill>
+                <a:effectLst/>
+                <a:latin typeface="Arial Unicode MS" panose="020B0604020202020204" pitchFamily="34" charset="-122"/>
+                <a:cs typeface="Arial" panose="020B0604020202020204" pitchFamily="34" charset="0"/>
+              </a:rPr>
+              <a:t>int VERSION_CODE</a:t>
+            </a:r>
+            <a:endParaRPr kumimoji="0" lang="zh-CN" altLang="zh-CN" sz="1600" b="0" i="0" u="none" strike="noStrike" cap="none" normalizeH="0" baseline="0" dirty="0" smtClean="0">
+              <a:ln>
+                <a:noFill/>
+              </a:ln>
+              <a:solidFill>
+                <a:srgbClr val="444444"/>
+              </a:solidFill>
+              <a:effectLst/>
+              <a:latin typeface="Arial" panose="020B0604020202020204" pitchFamily="34" charset="0"/>
+              <a:cs typeface="Arial" panose="020B0604020202020204" pitchFamily="34" charset="0"/>
+            </a:endParaRPr>
+          </a:p>
+          <a:p>
+            <a:pPr marL="342900" marR="0" lvl="0" indent="-342900" algn="l" defTabSz="914400" rtl="0" eaLnBrk="0" fontAlgn="base" latinLnBrk="0" hangingPunct="0">
+              <a:lnSpc>
+                <a:spcPct val="150000"/>
+              </a:lnSpc>
+              <a:spcBef>
+                <a:spcPct val="0"/>
+              </a:spcBef>
+              <a:spcAft>
+                <a:spcPct val="0"/>
+              </a:spcAft>
+              <a:buClrTx/>
+              <a:buSzTx/>
+              <a:buFont typeface="+mj-lt"/>
+              <a:buAutoNum type="arabicPeriod"/>
+              <a:tabLst/>
+            </a:pPr>
+            <a:r>
+              <a:rPr kumimoji="0" lang="zh-CN" altLang="zh-CN" sz="1600" b="0" i="0" u="none" strike="noStrike" cap="none" normalizeH="0" baseline="0" dirty="0" smtClean="0">
+                <a:ln>
+                  <a:noFill/>
+                </a:ln>
+                <a:solidFill>
+                  <a:srgbClr val="006000"/>
+                </a:solidFill>
+                <a:effectLst/>
+                <a:latin typeface="Arial Unicode MS" panose="020B0604020202020204" pitchFamily="34" charset="-122"/>
+                <a:cs typeface="Arial" panose="020B0604020202020204" pitchFamily="34" charset="0"/>
+              </a:rPr>
+              <a:t>String VERSION_NAME</a:t>
+            </a:r>
+            <a:endParaRPr kumimoji="0" lang="zh-CN" altLang="zh-CN" sz="1600" b="0" i="0" u="none" strike="noStrike" cap="none" normalizeH="0" baseline="0" dirty="0" smtClean="0">
+              <a:ln>
+                <a:noFill/>
+              </a:ln>
+              <a:solidFill>
+                <a:srgbClr val="444444"/>
+              </a:solidFill>
+              <a:effectLst/>
+              <a:latin typeface="Arial" panose="020B0604020202020204" pitchFamily="34" charset="0"/>
+              <a:cs typeface="Arial" panose="020B0604020202020204" pitchFamily="34" charset="0"/>
+            </a:endParaRPr>
+          </a:p>
+          <a:p>
+            <a:pPr marL="342900" marR="0" lvl="0" indent="-342900" algn="l" defTabSz="914400" rtl="0" eaLnBrk="0" fontAlgn="base" latinLnBrk="0" hangingPunct="0">
+              <a:lnSpc>
+                <a:spcPct val="150000"/>
+              </a:lnSpc>
+              <a:spcBef>
+                <a:spcPct val="0"/>
+              </a:spcBef>
+              <a:spcAft>
+                <a:spcPct val="0"/>
+              </a:spcAft>
+              <a:buClrTx/>
+              <a:buSzTx/>
+              <a:buFont typeface="+mj-lt"/>
+              <a:buAutoNum type="arabicPeriod"/>
+              <a:tabLst/>
+            </a:pPr>
+            <a:r>
+              <a:rPr kumimoji="0" lang="zh-CN" altLang="zh-CN" sz="1600" b="0" i="0" u="none" strike="noStrike" cap="none" normalizeH="0" baseline="0" dirty="0" smtClean="0">
+                <a:ln>
+                  <a:noFill/>
+                </a:ln>
+                <a:solidFill>
+                  <a:srgbClr val="006000"/>
+                </a:solidFill>
+                <a:effectLst/>
+                <a:latin typeface="Arial Unicode MS" panose="020B0604020202020204" pitchFamily="34" charset="-122"/>
+                <a:cs typeface="Arial" panose="020B0604020202020204" pitchFamily="34" charset="0"/>
+              </a:rPr>
+              <a:t>String APPLICATION_ID</a:t>
+            </a:r>
+            <a:endParaRPr kumimoji="0" lang="zh-CN" altLang="zh-CN" sz="1600" b="0" i="0" u="none" strike="noStrike" cap="none" normalizeH="0" baseline="0" dirty="0" smtClean="0">
+              <a:ln>
+                <a:noFill/>
+              </a:ln>
+              <a:solidFill>
+                <a:srgbClr val="444444"/>
+              </a:solidFill>
+              <a:effectLst/>
+              <a:latin typeface="Arial" panose="020B0604020202020204" pitchFamily="34" charset="0"/>
+              <a:cs typeface="Arial" panose="020B0604020202020204" pitchFamily="34" charset="0"/>
+            </a:endParaRPr>
+          </a:p>
+          <a:p>
+            <a:pPr marL="342900" marR="0" lvl="0" indent="-342900" algn="l" defTabSz="914400" rtl="0" eaLnBrk="0" fontAlgn="base" latinLnBrk="0" hangingPunct="0">
+              <a:lnSpc>
+                <a:spcPct val="150000"/>
+              </a:lnSpc>
+              <a:spcBef>
+                <a:spcPct val="0"/>
+              </a:spcBef>
+              <a:spcAft>
+                <a:spcPct val="0"/>
+              </a:spcAft>
+              <a:buClrTx/>
+              <a:buSzTx/>
+              <a:buFont typeface="+mj-lt"/>
+              <a:buAutoNum type="arabicPeriod"/>
+              <a:tabLst/>
+            </a:pPr>
+            <a:r>
+              <a:rPr kumimoji="0" lang="zh-CN" altLang="zh-CN" sz="1600" b="0" i="0" u="none" strike="noStrike" cap="none" normalizeH="0" baseline="0" dirty="0" smtClean="0">
+                <a:ln>
+                  <a:noFill/>
+                </a:ln>
+                <a:solidFill>
+                  <a:srgbClr val="006000"/>
+                </a:solidFill>
+                <a:effectLst/>
+                <a:latin typeface="Arial Unicode MS" panose="020B0604020202020204" pitchFamily="34" charset="-122"/>
+                <a:cs typeface="Arial" panose="020B0604020202020204" pitchFamily="34" charset="0"/>
+              </a:rPr>
+              <a:t>String BUILD_TYPE</a:t>
+            </a:r>
+            <a:r>
+              <a:rPr kumimoji="0" lang="zh-CN" altLang="zh-CN" sz="1600" b="0" i="0" u="none" strike="noStrike" cap="none" normalizeH="0" baseline="0" dirty="0" smtClean="0">
+                <a:ln>
+                  <a:noFill/>
+                </a:ln>
+                <a:solidFill>
+                  <a:srgbClr val="444444"/>
+                </a:solidFill>
+                <a:effectLst/>
+                <a:latin typeface="Arial" panose="020B0604020202020204" pitchFamily="34" charset="0"/>
+                <a:cs typeface="Arial" panose="020B0604020202020204" pitchFamily="34" charset="0"/>
+              </a:rPr>
+              <a:t> – name of the build type, e.g. "release"</a:t>
+            </a:r>
+          </a:p>
+          <a:p>
+            <a:pPr marL="342900" marR="0" lvl="0" indent="-342900" algn="l" defTabSz="914400" rtl="0" eaLnBrk="0" fontAlgn="base" latinLnBrk="0" hangingPunct="0">
+              <a:lnSpc>
+                <a:spcPct val="150000"/>
+              </a:lnSpc>
+              <a:spcBef>
+                <a:spcPct val="0"/>
+              </a:spcBef>
+              <a:spcAft>
+                <a:spcPct val="0"/>
+              </a:spcAft>
+              <a:buClrTx/>
+              <a:buSzTx/>
+              <a:buFont typeface="+mj-lt"/>
+              <a:buAutoNum type="arabicPeriod"/>
+              <a:tabLst/>
+            </a:pPr>
+            <a:r>
+              <a:rPr kumimoji="0" lang="zh-CN" altLang="zh-CN" sz="1600" b="0" i="0" u="none" strike="noStrike" cap="none" normalizeH="0" baseline="0" dirty="0" smtClean="0">
+                <a:ln>
+                  <a:noFill/>
+                </a:ln>
+                <a:solidFill>
+                  <a:srgbClr val="006000"/>
+                </a:solidFill>
+                <a:effectLst/>
+                <a:latin typeface="Arial Unicode MS" panose="020B0604020202020204" pitchFamily="34" charset="-122"/>
+                <a:cs typeface="Arial" panose="020B0604020202020204" pitchFamily="34" charset="0"/>
+              </a:rPr>
+              <a:t>String FLAVOR</a:t>
+            </a:r>
+            <a:r>
+              <a:rPr kumimoji="0" lang="zh-CN" altLang="zh-CN" sz="1600" b="0" i="0" u="none" strike="noStrike" cap="none" normalizeH="0" baseline="0" dirty="0" smtClean="0">
+                <a:ln>
+                  <a:noFill/>
+                </a:ln>
+                <a:solidFill>
+                  <a:srgbClr val="444444"/>
+                </a:solidFill>
+                <a:effectLst/>
+                <a:latin typeface="Arial" panose="020B0604020202020204" pitchFamily="34" charset="0"/>
+                <a:cs typeface="Arial" panose="020B0604020202020204" pitchFamily="34" charset="0"/>
+              </a:rPr>
+              <a:t> – name of the flavor, e.g. “</a:t>
+            </a:r>
+            <a:r>
+              <a:rPr kumimoji="0" lang="en-US" altLang="zh-CN" sz="1600" b="0" i="0" u="none" strike="noStrike" cap="none" normalizeH="0" baseline="0" dirty="0" err="1" smtClean="0">
+                <a:ln>
+                  <a:noFill/>
+                </a:ln>
+                <a:solidFill>
+                  <a:srgbClr val="444444"/>
+                </a:solidFill>
+                <a:effectLst/>
+                <a:latin typeface="Arial" panose="020B0604020202020204" pitchFamily="34" charset="0"/>
+                <a:cs typeface="Arial" panose="020B0604020202020204" pitchFamily="34" charset="0"/>
+              </a:rPr>
+              <a:t>flavor_gradle</a:t>
+            </a:r>
+            <a:r>
+              <a:rPr kumimoji="0" lang="zh-CN" altLang="zh-CN" sz="1600" b="0" i="0" u="none" strike="noStrike" cap="none" normalizeH="0" baseline="0" dirty="0" smtClean="0">
+                <a:ln>
+                  <a:noFill/>
+                </a:ln>
+                <a:solidFill>
+                  <a:srgbClr val="444444"/>
+                </a:solidFill>
+                <a:effectLst/>
+                <a:latin typeface="Arial" panose="020B0604020202020204" pitchFamily="34" charset="0"/>
+                <a:cs typeface="Arial" panose="020B0604020202020204" pitchFamily="34" charset="0"/>
+              </a:rPr>
+              <a:t>"</a:t>
+            </a:r>
+          </a:p>
+          <a:p>
+            <a:pPr marL="0" marR="0" lvl="0" indent="0" algn="l" defTabSz="914400" rtl="0" eaLnBrk="0" fontAlgn="base" latinLnBrk="0" hangingPunct="0">
+              <a:lnSpc>
+                <a:spcPct val="100000"/>
+              </a:lnSpc>
+              <a:spcBef>
+                <a:spcPct val="0"/>
+              </a:spcBef>
+              <a:spcAft>
+                <a:spcPct val="0"/>
+              </a:spcAft>
+              <a:buClrTx/>
+              <a:buSzTx/>
+              <a:buFontTx/>
+              <a:buNone/>
+              <a:tabLst/>
+            </a:pPr>
+            <a:endParaRPr kumimoji="0" lang="zh-CN" altLang="zh-CN" sz="1800" b="0" i="0" u="none" strike="noStrike" cap="none" normalizeH="0" baseline="0" dirty="0" smtClean="0">
+              <a:ln>
+                <a:noFill/>
+              </a:ln>
+              <a:solidFill>
+                <a:schemeClr val="tx1"/>
+              </a:solidFill>
+              <a:effectLst/>
+              <a:latin typeface="Arial" panose="020B0604020202020204" pitchFamily="34" charset="0"/>
+            </a:endParaRPr>
+          </a:p>
+        </p:txBody>
+      </p:sp>
+    </p:spTree>
+    <p:extLst>
+      <p:ext uri="{BB962C8B-B14F-4D97-AF65-F5344CB8AC3E}">
+        <p14:creationId xmlns:p14="http://schemas.microsoft.com/office/powerpoint/2010/main" val="1900024470"/>
+      </p:ext>
+    </p:extLst>
+  </p:cSld>
+  <p:clrMapOvr>
+    <a:masterClrMapping/>
+  </p:clrMapOvr>
+</p:sld>
+</file>
+
+<file path=ppt/slides/slide17.xml><?xml version="1.0" encoding="utf-8"?>
+<p:sld xmlns:a="http://schemas.openxmlformats.org/drawingml/2006/main" xmlns:r="http://schemas.openxmlformats.org/officeDocument/2006/relationships" xmlns:p="http://schemas.openxmlformats.org/presentationml/2006/main">
+  <p:cSld>
+    <p:spTree>
+      <p:nvGrpSpPr>
+        <p:cNvPr id="1" name=""/>
+        <p:cNvGrpSpPr/>
+        <p:nvPr/>
+      </p:nvGrpSpPr>
+      <p:grpSpPr>
+        <a:xfrm>
+          <a:off x="0" y="0"/>
+          <a:ext cx="0" cy="0"/>
+          <a:chOff x="0" y="0"/>
+          <a:chExt cx="0" cy="0"/>
+        </a:xfrm>
+      </p:grpSpPr>
+      <p:sp>
+        <p:nvSpPr>
+          <p:cNvPr id="5" name="标题 4"/>
+          <p:cNvSpPr>
+            <a:spLocks noGrp="1"/>
+          </p:cNvSpPr>
+          <p:nvPr>
+            <p:ph type="title"/>
+          </p:nvPr>
+        </p:nvSpPr>
+        <p:spPr/>
+        <p:txBody>
+          <a:bodyPr/>
+          <a:lstStyle/>
+          <a:p>
+            <a:r>
               <a:rPr lang="en-US" altLang="zh-CN" cap="none" dirty="0" smtClean="0"/>
               <a:t>References</a:t>
             </a:r>
@@ -7781,10 +9797,16 @@
           <a:lstStyle/>
           <a:p>
             <a:r>
+              <a:rPr lang="en-US" altLang="zh-CN" cap="none" dirty="0" smtClean="0">
+                <a:hlinkClick r:id="rId2"/>
+              </a:rPr>
+              <a:t>https</a:t>
+            </a:r>
+            <a:r>
               <a:rPr lang="en-US" altLang="zh-CN" cap="none" dirty="0">
                 <a:hlinkClick r:id="rId2"/>
               </a:rPr>
-              <a:t>https://</a:t>
+              <a:t>://</a:t>
             </a:r>
             <a:r>
               <a:rPr lang="en-US" altLang="zh-CN" cap="none" dirty="0" smtClean="0">
@@ -7866,6 +9888,42 @@
               </a:rPr>
               <a:t>developer.android.com/studio/releases/gradle-plugin.html#revisions</a:t>
             </a:r>
+            <a:endParaRPr lang="en-US" altLang="zh-CN" cap="none" dirty="0" smtClean="0"/>
+          </a:p>
+          <a:p>
+            <a:r>
+              <a:rPr lang="en-US" altLang="zh-CN" cap="none" dirty="0">
+                <a:hlinkClick r:id="rId7"/>
+              </a:rPr>
+              <a:t>https://</a:t>
+            </a:r>
+            <a:r>
+              <a:rPr lang="en-US" altLang="zh-CN" cap="none" dirty="0" smtClean="0">
+                <a:hlinkClick r:id="rId7"/>
+              </a:rPr>
+              <a:t>developer.android.com/studio/build/building-cmdline.html</a:t>
+            </a:r>
+            <a:endParaRPr lang="en-US" altLang="zh-CN" cap="none" dirty="0" smtClean="0"/>
+          </a:p>
+          <a:p>
+            <a:r>
+              <a:rPr lang="en-US" altLang="zh-CN" cap="none" dirty="0">
+                <a:hlinkClick r:id="rId8"/>
+              </a:rPr>
+              <a:t>http://google.github.io/android-gradle-dsl/current</a:t>
+            </a:r>
+            <a:r>
+              <a:rPr lang="en-US" altLang="zh-CN" cap="none" dirty="0" smtClean="0">
+                <a:hlinkClick r:id="rId8"/>
+              </a:rPr>
+              <a:t>/</a:t>
+            </a:r>
+            <a:endParaRPr lang="en-US" altLang="zh-CN" cap="none" dirty="0" smtClean="0"/>
+          </a:p>
+          <a:p>
+            <a:endParaRPr lang="en-US" altLang="zh-CN" cap="none" dirty="0" smtClean="0"/>
+          </a:p>
+          <a:p>
             <a:endParaRPr lang="en-US" altLang="zh-CN" cap="none" dirty="0" smtClean="0"/>
           </a:p>
           <a:p>
@@ -8052,60 +10110,42 @@
               <a:rPr lang="en-US" altLang="zh-CN" cap="none" dirty="0" smtClean="0">
                 <a:sym typeface="Wingdings" panose="05000000000000000000" pitchFamily="2" charset="2"/>
               </a:rPr>
-              <a:t>GNU </a:t>
+              <a:t>GNU Make</a:t>
+            </a:r>
+            <a:r>
+              <a:rPr lang="zh-CN" altLang="en-US" cap="none" dirty="0" smtClean="0">
+                <a:sym typeface="Wingdings" panose="05000000000000000000" pitchFamily="2" charset="2"/>
+              </a:rPr>
+              <a:t>、</a:t>
             </a:r>
             <a:r>
               <a:rPr lang="en-US" altLang="zh-CN" cap="none" dirty="0" smtClean="0">
                 <a:sym typeface="Wingdings" panose="05000000000000000000" pitchFamily="2" charset="2"/>
               </a:rPr>
-              <a:t>M</a:t>
+              <a:t>BSD make</a:t>
+            </a:r>
+            <a:r>
+              <a:rPr lang="zh-CN" altLang="en-US" cap="none" dirty="0" smtClean="0">
+                <a:sym typeface="Wingdings" panose="05000000000000000000" pitchFamily="2" charset="2"/>
+              </a:rPr>
+              <a:t>、</a:t>
             </a:r>
             <a:r>
               <a:rPr lang="en-US" altLang="zh-CN" cap="none" dirty="0" smtClean="0">
                 <a:sym typeface="Wingdings" panose="05000000000000000000" pitchFamily="2" charset="2"/>
               </a:rPr>
-              <a:t>ake</a:t>
-            </a:r>
-            <a:r>
-              <a:rPr lang="zh-CN" altLang="en-US" cap="none" dirty="0" smtClean="0">
+              <a:t>Microsoft </a:t>
+            </a:r>
+            <a:r>
+              <a:rPr lang="en-US" altLang="zh-CN" cap="none" dirty="0" err="1" smtClean="0">
                 <a:sym typeface="Wingdings" panose="05000000000000000000" pitchFamily="2" charset="2"/>
               </a:rPr>
-              <a:t>、</a:t>
+              <a:t>nMake</a:t>
             </a:r>
             <a:r>
               <a:rPr lang="en-US" altLang="zh-CN" cap="none" dirty="0" smtClean="0">
                 <a:sym typeface="Wingdings" panose="05000000000000000000" pitchFamily="2" charset="2"/>
               </a:rPr>
-              <a:t>BSD make</a:t>
-            </a:r>
-            <a:r>
-              <a:rPr lang="zh-CN" altLang="en-US" cap="none" dirty="0" smtClean="0">
-                <a:sym typeface="Wingdings" panose="05000000000000000000" pitchFamily="2" charset="2"/>
-              </a:rPr>
-              <a:t>、</a:t>
-            </a:r>
-            <a:r>
-              <a:rPr lang="en-US" altLang="zh-CN" cap="none" dirty="0" smtClean="0">
-                <a:sym typeface="Wingdings" panose="05000000000000000000" pitchFamily="2" charset="2"/>
-              </a:rPr>
-              <a:t>M</a:t>
-            </a:r>
-            <a:r>
-              <a:rPr lang="en-US" altLang="zh-CN" cap="none" dirty="0" smtClean="0">
-                <a:sym typeface="Wingdings" panose="05000000000000000000" pitchFamily="2" charset="2"/>
-              </a:rPr>
-              <a:t>icrosoft </a:t>
-            </a:r>
-            <a:r>
-              <a:rPr lang="en-US" altLang="zh-CN" cap="none" dirty="0" err="1" smtClean="0">
-                <a:sym typeface="Wingdings" panose="05000000000000000000" pitchFamily="2" charset="2"/>
-              </a:rPr>
-              <a:t>nMake</a:t>
-            </a:r>
-            <a:r>
-              <a:rPr lang="en-US" altLang="zh-CN" cap="none" dirty="0" smtClean="0">
-                <a:sym typeface="Wingdings" panose="05000000000000000000" pitchFamily="2" charset="2"/>
-              </a:rPr>
               <a:t> </a:t>
             </a:r>
             <a:r>
@@ -8208,11 +10248,7 @@
             </a:r>
             <a:r>
               <a:rPr lang="en-US" altLang="zh-CN" cap="none" dirty="0" smtClean="0"/>
-              <a:t> </a:t>
-            </a:r>
-            <a:r>
-              <a:rPr lang="en-US" altLang="zh-CN" cap="none" dirty="0" smtClean="0"/>
-              <a:t>follows the concept of convention over configuration</a:t>
+              <a:t> follows the concept of convention over configuration</a:t>
             </a:r>
             <a:endParaRPr lang="zh-CN" altLang="en-US" cap="none" dirty="0"/>
           </a:p>
@@ -8520,7 +10556,7 @@
           <a:p>
             <a:r>
               <a:rPr lang="zh-CN" altLang="en-US" dirty="0" smtClean="0"/>
-              <a:t>基本结构</a:t>
+              <a:t>最小配置</a:t>
             </a:r>
             <a:endParaRPr lang="zh-CN" altLang="en-US" dirty="0"/>
           </a:p>
@@ -8579,11 +10615,7 @@
             </a:r>
             <a:r>
               <a:rPr lang="zh-CN" altLang="en-US" dirty="0" smtClean="0"/>
-              <a:t>个部分</a:t>
-            </a:r>
-            <a:r>
-              <a:rPr lang="zh-CN" altLang="en-US" dirty="0" smtClean="0"/>
-              <a:t>组成：</a:t>
+              <a:t>个部分组成：</a:t>
             </a:r>
             <a:endParaRPr lang="en-US" altLang="zh-CN" dirty="0" smtClean="0"/>
           </a:p>
@@ -8996,11 +11028,7 @@
             </a:r>
             <a:r>
               <a:rPr lang="en-US" altLang="zh-CN" cap="none" dirty="0" smtClean="0"/>
-              <a:t> </a:t>
-            </a:r>
-            <a:r>
-              <a:rPr lang="en-US" altLang="zh-CN" cap="none" dirty="0" smtClean="0"/>
-              <a:t>tasks</a:t>
+              <a:t> tasks</a:t>
             </a:r>
             <a:endParaRPr lang="en-US" altLang="zh-CN" dirty="0" smtClean="0"/>
           </a:p>
@@ -9678,11 +11706,7 @@
           <a:p>
             <a:r>
               <a:rPr lang="zh-CN" altLang="en-US" cap="none" dirty="0"/>
-              <a:t>自动</a:t>
-            </a:r>
-            <a:r>
-              <a:rPr lang="zh-CN" altLang="en-US" cap="none" dirty="0"/>
-              <a:t>安装并保证安装正确的版本</a:t>
+              <a:t>自动安装并保证安装正确的版本</a:t>
             </a:r>
             <a:r>
               <a:rPr lang="en-US" altLang="zh-CN" cap="none" dirty="0"/>
@@ -9798,7 +11822,6 @@
               <a:rPr lang="zh-CN" altLang="en-US" dirty="0"/>
               <a:t>基本命令</a:t>
             </a:r>
-            <a:endParaRPr lang="zh-CN" altLang="en-US" dirty="0"/>
           </a:p>
         </p:txBody>
       </p:sp>
@@ -10109,11 +12132,7 @@
             </a:r>
             <a:r>
               <a:rPr lang="en-US" altLang="zh-CN" cap="none" dirty="0" smtClean="0"/>
-              <a:t> </a:t>
-            </a:r>
-            <a:r>
-              <a:rPr lang="en-US" altLang="zh-CN" cap="none" dirty="0" smtClean="0"/>
-              <a:t>version</a:t>
+              <a:t> version</a:t>
             </a:r>
             <a:r>
               <a:rPr lang="zh-CN" altLang="en-US" cap="none" dirty="0" smtClean="0"/>

</xml_diff>